<commit_message>
Upate home page, cross-platform section and use guide landscape figure
</commit_message>
<xml_diff>
--- a/images/bio_comp.pptx
+++ b/images/bio_comp.pptx
@@ -10,7 +10,7 @@
   <p:sldIdLst>
     <p:sldId id="346" r:id="rId2"/>
   </p:sldIdLst>
-  <p:sldSz cx="18288000" cy="10972800"/>
+  <p:sldSz cx="19259550" cy="6119813"/>
   <p:notesSz cx="6669088" cy="9872663"/>
   <p:custDataLst>
     <p:tags r:id="rId4"/>
@@ -113,12 +113,12 @@
   <p:extLst>
     <p:ext uri="{EFAFB233-063F-42B5-8137-9DF3F51BA10A}">
       <p15:sldGuideLst xmlns:p15="http://schemas.microsoft.com/office/powerpoint/2012/main">
-        <p15:guide id="1" orient="horz" pos="3456">
+        <p15:guide id="1" orient="horz" pos="1928" userDrawn="1">
           <p15:clr>
             <a:srgbClr val="A4A3A4"/>
           </p15:clr>
         </p15:guide>
-        <p15:guide id="2" pos="5760">
+        <p15:guide id="2" pos="6067" userDrawn="1">
           <p15:clr>
             <a:srgbClr val="A4A3A4"/>
           </p15:clr>
@@ -127,6 +127,148 @@
     </p:ext>
   </p:extLst>
 </p:presentation>
+</file>
+
+<file path=ppt/revisionInfo.xml><?xml version="1.0" encoding="utf-8"?>
+<p1510:revInfo xmlns:a="http://schemas.openxmlformats.org/drawingml/2006/main" xmlns:r="http://schemas.openxmlformats.org/officeDocument/2006/relationships" xmlns:p1510="http://schemas.microsoft.com/office/powerpoint/2015/10/main">
+  <p1510:revLst>
+    <p1510:client id="{2DF94F95-9AAE-D848-9D52-B537298E3443}" v="111" dt="2021-01-05T23:46:07.306"/>
+    <p1510:client id="{AF84D99B-182C-F045-9C68-FCA01E7EE4D7}" v="6" dt="2021-01-05T23:52:17.536"/>
+  </p1510:revLst>
+</p1510:revInfo>
+</file>
+
+<file path=ppt/changesInfos/changesInfo1.xml><?xml version="1.0" encoding="utf-8"?>
+<pc:chgInfo xmlns:a="http://schemas.openxmlformats.org/drawingml/2006/main" xmlns:r="http://schemas.openxmlformats.org/officeDocument/2006/relationships" xmlns:ac="http://schemas.microsoft.com/office/drawing/2013/main/command" xmlns:pc="http://schemas.microsoft.com/office/powerpoint/2013/main/command">
+  <pc:docChgLst>
+    <pc:chgData name="Jacek Marzec" userId="2800961e-4734-42e6-95ff-c18dd3ecd33a" providerId="ADAL" clId="{AF84D99B-182C-F045-9C68-FCA01E7EE4D7}"/>
+    <pc:docChg chg="undo redo custSel modSld">
+      <pc:chgData name="Jacek Marzec" userId="2800961e-4734-42e6-95ff-c18dd3ecd33a" providerId="ADAL" clId="{AF84D99B-182C-F045-9C68-FCA01E7EE4D7}" dt="2021-01-05T23:57:56.830" v="126" actId="14100"/>
+      <pc:docMkLst>
+        <pc:docMk/>
+      </pc:docMkLst>
+      <pc:sldChg chg="addSp delSp modSp mod">
+        <pc:chgData name="Jacek Marzec" userId="2800961e-4734-42e6-95ff-c18dd3ecd33a" providerId="ADAL" clId="{AF84D99B-182C-F045-9C68-FCA01E7EE4D7}" dt="2021-01-05T23:57:56.830" v="126" actId="14100"/>
+        <pc:sldMkLst>
+          <pc:docMk/>
+          <pc:sldMk cId="3705165585" sldId="346"/>
+        </pc:sldMkLst>
+        <pc:spChg chg="add del mod">
+          <ac:chgData name="Jacek Marzec" userId="2800961e-4734-42e6-95ff-c18dd3ecd33a" providerId="ADAL" clId="{AF84D99B-182C-F045-9C68-FCA01E7EE4D7}" dt="2021-01-05T23:52:55.358" v="96" actId="1076"/>
+          <ac:spMkLst>
+            <pc:docMk/>
+            <pc:sldMk cId="3705165585" sldId="346"/>
+            <ac:spMk id="2" creationId="{45F6E278-7332-8549-98F4-DA3B446DED55}"/>
+          </ac:spMkLst>
+        </pc:spChg>
+        <pc:spChg chg="mod">
+          <ac:chgData name="Jacek Marzec" userId="2800961e-4734-42e6-95ff-c18dd3ecd33a" providerId="ADAL" clId="{AF84D99B-182C-F045-9C68-FCA01E7EE4D7}" dt="2021-01-05T23:57:52.461" v="125" actId="14100"/>
+          <ac:spMkLst>
+            <pc:docMk/>
+            <pc:sldMk cId="3705165585" sldId="346"/>
+            <ac:spMk id="3" creationId="{756AB332-D807-5F41-8A6E-C68B873D2884}"/>
+          </ac:spMkLst>
+        </pc:spChg>
+        <pc:spChg chg="mod">
+          <ac:chgData name="Jacek Marzec" userId="2800961e-4734-42e6-95ff-c18dd3ecd33a" providerId="ADAL" clId="{AF84D99B-182C-F045-9C68-FCA01E7EE4D7}" dt="2021-01-05T23:57:12.729" v="124" actId="1076"/>
+          <ac:spMkLst>
+            <pc:docMk/>
+            <pc:sldMk cId="3705165585" sldId="346"/>
+            <ac:spMk id="57" creationId="{00000000-0000-0000-0000-000000000000}"/>
+          </ac:spMkLst>
+        </pc:spChg>
+        <pc:spChg chg="mod">
+          <ac:chgData name="Jacek Marzec" userId="2800961e-4734-42e6-95ff-c18dd3ecd33a" providerId="ADAL" clId="{AF84D99B-182C-F045-9C68-FCA01E7EE4D7}" dt="2021-01-05T23:57:05.225" v="121" actId="1076"/>
+          <ac:spMkLst>
+            <pc:docMk/>
+            <pc:sldMk cId="3705165585" sldId="346"/>
+            <ac:spMk id="58" creationId="{00000000-0000-0000-0000-000000000000}"/>
+          </ac:spMkLst>
+        </pc:spChg>
+        <pc:spChg chg="mod">
+          <ac:chgData name="Jacek Marzec" userId="2800961e-4734-42e6-95ff-c18dd3ecd33a" providerId="ADAL" clId="{AF84D99B-182C-F045-9C68-FCA01E7EE4D7}" dt="2021-01-05T23:56:59.736" v="119" actId="1076"/>
+          <ac:spMkLst>
+            <pc:docMk/>
+            <pc:sldMk cId="3705165585" sldId="346"/>
+            <ac:spMk id="59" creationId="{00000000-0000-0000-0000-000000000000}"/>
+          </ac:spMkLst>
+        </pc:spChg>
+        <pc:spChg chg="mod">
+          <ac:chgData name="Jacek Marzec" userId="2800961e-4734-42e6-95ff-c18dd3ecd33a" providerId="ADAL" clId="{AF84D99B-182C-F045-9C68-FCA01E7EE4D7}" dt="2021-01-05T23:56:47.878" v="115" actId="14100"/>
+          <ac:spMkLst>
+            <pc:docMk/>
+            <pc:sldMk cId="3705165585" sldId="346"/>
+            <ac:spMk id="67" creationId="{00000000-0000-0000-0000-000000000000}"/>
+          </ac:spMkLst>
+        </pc:spChg>
+        <pc:spChg chg="add mod">
+          <ac:chgData name="Jacek Marzec" userId="2800961e-4734-42e6-95ff-c18dd3ecd33a" providerId="ADAL" clId="{AF84D99B-182C-F045-9C68-FCA01E7EE4D7}" dt="2021-01-05T23:52:22.777" v="92" actId="1076"/>
+          <ac:spMkLst>
+            <pc:docMk/>
+            <pc:sldMk cId="3705165585" sldId="346"/>
+            <ac:spMk id="101" creationId="{FF0DF1BE-2188-DC41-836C-D80F9306685A}"/>
+          </ac:spMkLst>
+        </pc:spChg>
+        <pc:spChg chg="add mod">
+          <ac:chgData name="Jacek Marzec" userId="2800961e-4734-42e6-95ff-c18dd3ecd33a" providerId="ADAL" clId="{AF84D99B-182C-F045-9C68-FCA01E7EE4D7}" dt="2021-01-05T23:51:48.237" v="81" actId="1076"/>
+          <ac:spMkLst>
+            <pc:docMk/>
+            <pc:sldMk cId="3705165585" sldId="346"/>
+            <ac:spMk id="107" creationId="{4FE830D2-D8A6-D044-839E-83F203700DA2}"/>
+          </ac:spMkLst>
+        </pc:spChg>
+        <pc:spChg chg="mod">
+          <ac:chgData name="Jacek Marzec" userId="2800961e-4734-42e6-95ff-c18dd3ecd33a" providerId="ADAL" clId="{AF84D99B-182C-F045-9C68-FCA01E7EE4D7}" dt="2021-01-05T23:56:55.111" v="117" actId="1076"/>
+          <ac:spMkLst>
+            <pc:docMk/>
+            <pc:sldMk cId="3705165585" sldId="346"/>
+            <ac:spMk id="108" creationId="{00000000-0000-0000-0000-000000000000}"/>
+          </ac:spMkLst>
+        </pc:spChg>
+        <pc:spChg chg="add mod">
+          <ac:chgData name="Jacek Marzec" userId="2800961e-4734-42e6-95ff-c18dd3ecd33a" providerId="ADAL" clId="{AF84D99B-182C-F045-9C68-FCA01E7EE4D7}" dt="2021-01-05T23:52:13.285" v="89" actId="1076"/>
+          <ac:spMkLst>
+            <pc:docMk/>
+            <pc:sldMk cId="3705165585" sldId="346"/>
+            <ac:spMk id="140" creationId="{7FBB00ED-6B05-E443-934B-223B2B73C573}"/>
+          </ac:spMkLst>
+        </pc:spChg>
+        <pc:spChg chg="mod">
+          <ac:chgData name="Jacek Marzec" userId="2800961e-4734-42e6-95ff-c18dd3ecd33a" providerId="ADAL" clId="{AF84D99B-182C-F045-9C68-FCA01E7EE4D7}" dt="2021-01-05T23:57:56.830" v="126" actId="14100"/>
+          <ac:spMkLst>
+            <pc:docMk/>
+            <pc:sldMk cId="3705165585" sldId="346"/>
+            <ac:spMk id="176" creationId="{4D2B39E5-3161-0244-A8BE-D51B0B9B315C}"/>
+          </ac:spMkLst>
+        </pc:spChg>
+        <pc:cxnChg chg="add mod">
+          <ac:chgData name="Jacek Marzec" userId="2800961e-4734-42e6-95ff-c18dd3ecd33a" providerId="ADAL" clId="{AF84D99B-182C-F045-9C68-FCA01E7EE4D7}" dt="2021-01-05T23:52:41.620" v="94" actId="14100"/>
+          <ac:cxnSpMkLst>
+            <pc:docMk/>
+            <pc:sldMk cId="3705165585" sldId="346"/>
+            <ac:cxnSpMk id="5" creationId="{EF885950-A1FC-7F4F-AED0-2B716D4F1AA2}"/>
+          </ac:cxnSpMkLst>
+        </pc:cxnChg>
+        <pc:cxnChg chg="add mod">
+          <ac:chgData name="Jacek Marzec" userId="2800961e-4734-42e6-95ff-c18dd3ecd33a" providerId="ADAL" clId="{AF84D99B-182C-F045-9C68-FCA01E7EE4D7}" dt="2021-01-05T23:52:00.963" v="87" actId="14100"/>
+          <ac:cxnSpMkLst>
+            <pc:docMk/>
+            <pc:sldMk cId="3705165585" sldId="346"/>
+            <ac:cxnSpMk id="144" creationId="{A31D69DE-672A-DD4A-A637-7B71E4451761}"/>
+          </ac:cxnSpMkLst>
+        </pc:cxnChg>
+        <pc:cxnChg chg="add mod">
+          <ac:chgData name="Jacek Marzec" userId="2800961e-4734-42e6-95ff-c18dd3ecd33a" providerId="ADAL" clId="{AF84D99B-182C-F045-9C68-FCA01E7EE4D7}" dt="2021-01-05T23:52:21.090" v="91" actId="1076"/>
+          <ac:cxnSpMkLst>
+            <pc:docMk/>
+            <pc:sldMk cId="3705165585" sldId="346"/>
+            <ac:cxnSpMk id="145" creationId="{77910412-B71E-C14F-AA16-D1CEDB5D5429}"/>
+          </ac:cxnSpMkLst>
+        </pc:cxnChg>
+      </pc:sldChg>
+    </pc:docChg>
+  </pc:docChgLst>
+</pc:chgInfo>
 </file>
 
 <file path=ppt/notesMasters/notesMaster1.xml><?xml version="1.0" encoding="utf-8"?>
@@ -211,7 +353,7 @@
           <a:p>
             <a:fld id="{8CEF0C78-9345-4EFD-80DF-498B2E68F0AC}" type="datetimeFigureOut">
               <a:rPr lang="en-GB" smtClean="0"/>
-              <a:t>14/11/2017</a:t>
+              <a:t>08/01/2021</a:t>
             </a:fld>
             <a:endParaRPr lang="en-GB"/>
           </a:p>
@@ -229,8 +371,8 @@
         </p:nvSpPr>
         <p:spPr>
           <a:xfrm>
-            <a:off x="247650" y="739775"/>
-            <a:ext cx="6173788" cy="3703638"/>
+            <a:off x="-2492375" y="739775"/>
+            <a:ext cx="11653838" cy="3703638"/>
           </a:xfrm>
           <a:prstGeom prst="rect">
             <a:avLst/>
@@ -277,35 +419,35 @@
           <a:p>
             <a:pPr lvl="0"/>
             <a:r>
-              <a:rPr lang="en-US" smtClean="0"/>
+              <a:rPr lang="en-US"/>
               <a:t>Click to edit Master text styles</a:t>
             </a:r>
           </a:p>
           <a:p>
             <a:pPr lvl="1"/>
             <a:r>
-              <a:rPr lang="en-US" smtClean="0"/>
+              <a:rPr lang="en-US"/>
               <a:t>Second level</a:t>
             </a:r>
           </a:p>
           <a:p>
             <a:pPr lvl="2"/>
             <a:r>
-              <a:rPr lang="en-US" smtClean="0"/>
+              <a:rPr lang="en-US"/>
               <a:t>Third level</a:t>
             </a:r>
           </a:p>
           <a:p>
             <a:pPr lvl="3"/>
             <a:r>
-              <a:rPr lang="en-US" smtClean="0"/>
+              <a:rPr lang="en-US"/>
               <a:t>Fourth level</a:t>
             </a:r>
           </a:p>
           <a:p>
             <a:pPr lvl="4"/>
             <a:r>
-              <a:rPr lang="en-US" smtClean="0"/>
+              <a:rPr lang="en-US"/>
               <a:t>Fifth level</a:t>
             </a:r>
             <a:endParaRPr lang="en-GB"/>
@@ -510,8 +652,8 @@
         </p:nvSpPr>
         <p:spPr>
           <a:xfrm>
-            <a:off x="247650" y="739775"/>
-            <a:ext cx="6173788" cy="3703638"/>
+            <a:off x="-2492375" y="739775"/>
+            <a:ext cx="11653838" cy="3703638"/>
           </a:xfrm>
         </p:spPr>
       </p:sp>
@@ -601,8 +743,8 @@
         </p:nvSpPr>
         <p:spPr>
           <a:xfrm>
-            <a:off x="1371600" y="3408686"/>
-            <a:ext cx="15544800" cy="2352040"/>
+            <a:off x="1444476" y="1901116"/>
+            <a:ext cx="16370619" cy="1311793"/>
           </a:xfrm>
         </p:spPr>
         <p:txBody>
@@ -610,7 +752,7 @@
           <a:lstStyle/>
           <a:p>
             <a:r>
-              <a:rPr lang="en-US" smtClean="0"/>
+              <a:rPr lang="en-US"/>
               <a:t>Click to edit Master title style</a:t>
             </a:r>
             <a:endParaRPr lang="en-GB"/>
@@ -629,8 +771,8 @@
         </p:nvSpPr>
         <p:spPr>
           <a:xfrm>
-            <a:off x="2743200" y="6217920"/>
-            <a:ext cx="12801600" cy="2804160"/>
+            <a:off x="2888940" y="3467897"/>
+            <a:ext cx="13481685" cy="1563952"/>
           </a:xfrm>
         </p:spPr>
         <p:txBody>
@@ -729,7 +871,7 @@
           </a:lstStyle>
           <a:p>
             <a:r>
-              <a:rPr lang="en-US" smtClean="0"/>
+              <a:rPr lang="en-US"/>
               <a:t>Click to edit Master subtitle style</a:t>
             </a:r>
             <a:endParaRPr lang="en-GB"/>
@@ -754,7 +896,7 @@
             <a:fld id="{D9C21BDE-47B6-43FF-A3A5-B9B58F4B646D}" type="datetimeFigureOut">
               <a:rPr lang="en-US" smtClean="0"/>
               <a:pPr/>
-              <a:t>11/14/17</a:t>
+              <a:t>1/8/21</a:t>
             </a:fld>
             <a:endParaRPr lang="en-GB"/>
           </a:p>
@@ -844,7 +986,7 @@
           <a:lstStyle/>
           <a:p>
             <a:r>
-              <a:rPr lang="en-US" smtClean="0"/>
+              <a:rPr lang="en-US"/>
               <a:t>Click to edit Master title style</a:t>
             </a:r>
             <a:endParaRPr lang="en-GB"/>
@@ -868,35 +1010,35 @@
           <a:p>
             <a:pPr lvl="0"/>
             <a:r>
-              <a:rPr lang="en-US" smtClean="0"/>
+              <a:rPr lang="en-US"/>
               <a:t>Click to edit Master text styles</a:t>
             </a:r>
           </a:p>
           <a:p>
             <a:pPr lvl="1"/>
             <a:r>
-              <a:rPr lang="en-US" smtClean="0"/>
+              <a:rPr lang="en-US"/>
               <a:t>Second level</a:t>
             </a:r>
           </a:p>
           <a:p>
             <a:pPr lvl="2"/>
             <a:r>
-              <a:rPr lang="en-US" smtClean="0"/>
+              <a:rPr lang="en-US"/>
               <a:t>Third level</a:t>
             </a:r>
           </a:p>
           <a:p>
             <a:pPr lvl="3"/>
             <a:r>
-              <a:rPr lang="en-US" smtClean="0"/>
+              <a:rPr lang="en-US"/>
               <a:t>Fourth level</a:t>
             </a:r>
           </a:p>
           <a:p>
             <a:pPr lvl="4"/>
             <a:r>
-              <a:rPr lang="en-US" smtClean="0"/>
+              <a:rPr lang="en-US"/>
               <a:t>Fifth level</a:t>
             </a:r>
             <a:endParaRPr lang="en-GB"/>
@@ -921,7 +1063,7 @@
             <a:fld id="{D9C21BDE-47B6-43FF-A3A5-B9B58F4B646D}" type="datetimeFigureOut">
               <a:rPr lang="en-US" smtClean="0"/>
               <a:pPr/>
-              <a:t>11/14/17</a:t>
+              <a:t>1/8/21</a:t>
             </a:fld>
             <a:endParaRPr lang="en-GB"/>
           </a:p>
@@ -1007,8 +1149,8 @@
         </p:nvSpPr>
         <p:spPr>
           <a:xfrm>
-            <a:off x="13258800" y="439427"/>
-            <a:ext cx="4114800" cy="9362440"/>
+            <a:off x="13963189" y="245084"/>
+            <a:ext cx="4333399" cy="5221674"/>
           </a:xfrm>
         </p:spPr>
         <p:txBody>
@@ -1016,7 +1158,7 @@
           <a:lstStyle/>
           <a:p>
             <a:r>
-              <a:rPr lang="en-US" smtClean="0"/>
+              <a:rPr lang="en-US"/>
               <a:t>Click to edit Master title style</a:t>
             </a:r>
             <a:endParaRPr lang="en-GB"/>
@@ -1035,8 +1177,8 @@
         </p:nvSpPr>
         <p:spPr>
           <a:xfrm>
-            <a:off x="914400" y="439427"/>
-            <a:ext cx="12039600" cy="9362440"/>
+            <a:off x="962978" y="245084"/>
+            <a:ext cx="12679204" cy="5221674"/>
           </a:xfrm>
         </p:spPr>
         <p:txBody>
@@ -1045,35 +1187,35 @@
           <a:p>
             <a:pPr lvl="0"/>
             <a:r>
-              <a:rPr lang="en-US" smtClean="0"/>
+              <a:rPr lang="en-US"/>
               <a:t>Click to edit Master text styles</a:t>
             </a:r>
           </a:p>
           <a:p>
             <a:pPr lvl="1"/>
             <a:r>
-              <a:rPr lang="en-US" smtClean="0"/>
+              <a:rPr lang="en-US"/>
               <a:t>Second level</a:t>
             </a:r>
           </a:p>
           <a:p>
             <a:pPr lvl="2"/>
             <a:r>
-              <a:rPr lang="en-US" smtClean="0"/>
+              <a:rPr lang="en-US"/>
               <a:t>Third level</a:t>
             </a:r>
           </a:p>
           <a:p>
             <a:pPr lvl="3"/>
             <a:r>
-              <a:rPr lang="en-US" smtClean="0"/>
+              <a:rPr lang="en-US"/>
               <a:t>Fourth level</a:t>
             </a:r>
           </a:p>
           <a:p>
             <a:pPr lvl="4"/>
             <a:r>
-              <a:rPr lang="en-US" smtClean="0"/>
+              <a:rPr lang="en-US"/>
               <a:t>Fifth level</a:t>
             </a:r>
             <a:endParaRPr lang="en-GB"/>
@@ -1098,7 +1240,7 @@
             <a:fld id="{D9C21BDE-47B6-43FF-A3A5-B9B58F4B646D}" type="datetimeFigureOut">
               <a:rPr lang="en-US" smtClean="0"/>
               <a:pPr/>
-              <a:t>11/14/17</a:t>
+              <a:t>1/8/21</a:t>
             </a:fld>
             <a:endParaRPr lang="en-GB"/>
           </a:p>
@@ -1188,7 +1330,7 @@
           <a:lstStyle/>
           <a:p>
             <a:r>
-              <a:rPr lang="en-US" smtClean="0"/>
+              <a:rPr lang="en-US"/>
               <a:t>Click to edit Master title style</a:t>
             </a:r>
             <a:endParaRPr lang="en-GB"/>
@@ -1212,35 +1354,35 @@
           <a:p>
             <a:pPr lvl="0"/>
             <a:r>
-              <a:rPr lang="en-US" smtClean="0"/>
+              <a:rPr lang="en-US"/>
               <a:t>Click to edit Master text styles</a:t>
             </a:r>
           </a:p>
           <a:p>
             <a:pPr lvl="1"/>
             <a:r>
-              <a:rPr lang="en-US" smtClean="0"/>
+              <a:rPr lang="en-US"/>
               <a:t>Second level</a:t>
             </a:r>
           </a:p>
           <a:p>
             <a:pPr lvl="2"/>
             <a:r>
-              <a:rPr lang="en-US" smtClean="0"/>
+              <a:rPr lang="en-US"/>
               <a:t>Third level</a:t>
             </a:r>
           </a:p>
           <a:p>
             <a:pPr lvl="3"/>
             <a:r>
-              <a:rPr lang="en-US" smtClean="0"/>
+              <a:rPr lang="en-US"/>
               <a:t>Fourth level</a:t>
             </a:r>
           </a:p>
           <a:p>
             <a:pPr lvl="4"/>
             <a:r>
-              <a:rPr lang="en-US" smtClean="0"/>
+              <a:rPr lang="en-US"/>
               <a:t>Fifth level</a:t>
             </a:r>
             <a:endParaRPr lang="en-GB"/>
@@ -1265,7 +1407,7 @@
             <a:fld id="{D9C21BDE-47B6-43FF-A3A5-B9B58F4B646D}" type="datetimeFigureOut">
               <a:rPr lang="en-US" smtClean="0"/>
               <a:pPr/>
-              <a:t>11/14/17</a:t>
+              <a:t>1/8/21</a:t>
             </a:fld>
             <a:endParaRPr lang="en-GB"/>
           </a:p>
@@ -1351,8 +1493,8 @@
         </p:nvSpPr>
         <p:spPr>
           <a:xfrm>
-            <a:off x="1444627" y="7051044"/>
-            <a:ext cx="15544800" cy="2179320"/>
+            <a:off x="1521386" y="3932552"/>
+            <a:ext cx="16370619" cy="1215462"/>
           </a:xfrm>
         </p:spPr>
         <p:txBody>
@@ -1364,7 +1506,7 @@
           </a:lstStyle>
           <a:p>
             <a:r>
-              <a:rPr lang="en-US" smtClean="0"/>
+              <a:rPr lang="en-US"/>
               <a:t>Click to edit Master title style</a:t>
             </a:r>
             <a:endParaRPr lang="en-GB"/>
@@ -1383,8 +1525,8 @@
         </p:nvSpPr>
         <p:spPr>
           <a:xfrm>
-            <a:off x="1444627" y="4650746"/>
-            <a:ext cx="15544800" cy="2400299"/>
+            <a:off x="1521386" y="2593845"/>
+            <a:ext cx="16370619" cy="1338709"/>
           </a:xfrm>
         </p:spPr>
         <p:txBody>
@@ -1484,7 +1626,7 @@
           <a:p>
             <a:pPr lvl="0"/>
             <a:r>
-              <a:rPr lang="en-US" smtClean="0"/>
+              <a:rPr lang="en-US"/>
               <a:t>Click to edit Master text styles</a:t>
             </a:r>
           </a:p>
@@ -1508,7 +1650,7 @@
             <a:fld id="{D9C21BDE-47B6-43FF-A3A5-B9B58F4B646D}" type="datetimeFigureOut">
               <a:rPr lang="en-US" smtClean="0"/>
               <a:pPr/>
-              <a:t>11/14/17</a:t>
+              <a:t>1/8/21</a:t>
             </a:fld>
             <a:endParaRPr lang="en-GB"/>
           </a:p>
@@ -1598,7 +1740,7 @@
           <a:lstStyle/>
           <a:p>
             <a:r>
-              <a:rPr lang="en-US" smtClean="0"/>
+              <a:rPr lang="en-US"/>
               <a:t>Click to edit Master title style</a:t>
             </a:r>
             <a:endParaRPr lang="en-GB"/>
@@ -1617,8 +1759,8 @@
         </p:nvSpPr>
         <p:spPr>
           <a:xfrm>
-            <a:off x="914400" y="2560324"/>
-            <a:ext cx="8077200" cy="7241540"/>
+            <a:off x="962987" y="1427959"/>
+            <a:ext cx="8506301" cy="4038793"/>
           </a:xfrm>
         </p:spPr>
         <p:txBody>
@@ -1655,35 +1797,35 @@
           <a:p>
             <a:pPr lvl="0"/>
             <a:r>
-              <a:rPr lang="en-US" smtClean="0"/>
+              <a:rPr lang="en-US"/>
               <a:t>Click to edit Master text styles</a:t>
             </a:r>
           </a:p>
           <a:p>
             <a:pPr lvl="1"/>
             <a:r>
-              <a:rPr lang="en-US" smtClean="0"/>
+              <a:rPr lang="en-US"/>
               <a:t>Second level</a:t>
             </a:r>
           </a:p>
           <a:p>
             <a:pPr lvl="2"/>
             <a:r>
-              <a:rPr lang="en-US" smtClean="0"/>
+              <a:rPr lang="en-US"/>
               <a:t>Third level</a:t>
             </a:r>
           </a:p>
           <a:p>
             <a:pPr lvl="3"/>
             <a:r>
-              <a:rPr lang="en-US" smtClean="0"/>
+              <a:rPr lang="en-US"/>
               <a:t>Fourth level</a:t>
             </a:r>
           </a:p>
           <a:p>
             <a:pPr lvl="4"/>
             <a:r>
-              <a:rPr lang="en-US" smtClean="0"/>
+              <a:rPr lang="en-US"/>
               <a:t>Fifth level</a:t>
             </a:r>
             <a:endParaRPr lang="en-GB"/>
@@ -1702,8 +1844,8 @@
         </p:nvSpPr>
         <p:spPr>
           <a:xfrm>
-            <a:off x="9296400" y="2560324"/>
-            <a:ext cx="8077200" cy="7241540"/>
+            <a:off x="9790283" y="1427959"/>
+            <a:ext cx="8506301" cy="4038793"/>
           </a:xfrm>
         </p:spPr>
         <p:txBody>
@@ -1740,35 +1882,35 @@
           <a:p>
             <a:pPr lvl="0"/>
             <a:r>
-              <a:rPr lang="en-US" smtClean="0"/>
+              <a:rPr lang="en-US"/>
               <a:t>Click to edit Master text styles</a:t>
             </a:r>
           </a:p>
           <a:p>
             <a:pPr lvl="1"/>
             <a:r>
-              <a:rPr lang="en-US" smtClean="0"/>
+              <a:rPr lang="en-US"/>
               <a:t>Second level</a:t>
             </a:r>
           </a:p>
           <a:p>
             <a:pPr lvl="2"/>
             <a:r>
-              <a:rPr lang="en-US" smtClean="0"/>
+              <a:rPr lang="en-US"/>
               <a:t>Third level</a:t>
             </a:r>
           </a:p>
           <a:p>
             <a:pPr lvl="3"/>
             <a:r>
-              <a:rPr lang="en-US" smtClean="0"/>
+              <a:rPr lang="en-US"/>
               <a:t>Fourth level</a:t>
             </a:r>
           </a:p>
           <a:p>
             <a:pPr lvl="4"/>
             <a:r>
-              <a:rPr lang="en-US" smtClean="0"/>
+              <a:rPr lang="en-US"/>
               <a:t>Fifth level</a:t>
             </a:r>
             <a:endParaRPr lang="en-GB"/>
@@ -1793,7 +1935,7 @@
             <a:fld id="{D9C21BDE-47B6-43FF-A3A5-B9B58F4B646D}" type="datetimeFigureOut">
               <a:rPr lang="en-US" smtClean="0"/>
               <a:pPr/>
-              <a:t>11/14/17</a:t>
+              <a:t>1/8/21</a:t>
             </a:fld>
             <a:endParaRPr lang="en-GB"/>
           </a:p>
@@ -1887,7 +2029,7 @@
           </a:lstStyle>
           <a:p>
             <a:r>
-              <a:rPr lang="en-US" smtClean="0"/>
+              <a:rPr lang="en-US"/>
               <a:t>Click to edit Master title style</a:t>
             </a:r>
             <a:endParaRPr lang="en-GB"/>
@@ -1906,8 +2048,8 @@
         </p:nvSpPr>
         <p:spPr>
           <a:xfrm>
-            <a:off x="914400" y="2456186"/>
-            <a:ext cx="8080376" cy="1023620"/>
+            <a:off x="962988" y="1369881"/>
+            <a:ext cx="8509646" cy="570899"/>
           </a:xfrm>
         </p:spPr>
         <p:txBody>
@@ -1953,7 +2095,7 @@
           <a:p>
             <a:pPr lvl="0"/>
             <a:r>
-              <a:rPr lang="en-US" smtClean="0"/>
+              <a:rPr lang="en-US"/>
               <a:t>Click to edit Master text styles</a:t>
             </a:r>
           </a:p>
@@ -1971,8 +2113,8 @@
         </p:nvSpPr>
         <p:spPr>
           <a:xfrm>
-            <a:off x="914400" y="3479800"/>
-            <a:ext cx="8080376" cy="6322061"/>
+            <a:off x="962988" y="1940777"/>
+            <a:ext cx="8509646" cy="3525976"/>
           </a:xfrm>
         </p:spPr>
         <p:txBody>
@@ -2009,35 +2151,35 @@
           <a:p>
             <a:pPr lvl="0"/>
             <a:r>
-              <a:rPr lang="en-US" smtClean="0"/>
+              <a:rPr lang="en-US"/>
               <a:t>Click to edit Master text styles</a:t>
             </a:r>
           </a:p>
           <a:p>
             <a:pPr lvl="1"/>
             <a:r>
-              <a:rPr lang="en-US" smtClean="0"/>
+              <a:rPr lang="en-US"/>
               <a:t>Second level</a:t>
             </a:r>
           </a:p>
           <a:p>
             <a:pPr lvl="2"/>
             <a:r>
-              <a:rPr lang="en-US" smtClean="0"/>
+              <a:rPr lang="en-US"/>
               <a:t>Third level</a:t>
             </a:r>
           </a:p>
           <a:p>
             <a:pPr lvl="3"/>
             <a:r>
-              <a:rPr lang="en-US" smtClean="0"/>
+              <a:rPr lang="en-US"/>
               <a:t>Fourth level</a:t>
             </a:r>
           </a:p>
           <a:p>
             <a:pPr lvl="4"/>
             <a:r>
-              <a:rPr lang="en-US" smtClean="0"/>
+              <a:rPr lang="en-US"/>
               <a:t>Fifth level</a:t>
             </a:r>
             <a:endParaRPr lang="en-GB"/>
@@ -2056,8 +2198,8 @@
         </p:nvSpPr>
         <p:spPr>
           <a:xfrm>
-            <a:off x="9290059" y="2456186"/>
-            <a:ext cx="8083551" cy="1023620"/>
+            <a:off x="9783594" y="1369881"/>
+            <a:ext cx="8512990" cy="570899"/>
           </a:xfrm>
         </p:spPr>
         <p:txBody>
@@ -2103,7 +2245,7 @@
           <a:p>
             <a:pPr lvl="0"/>
             <a:r>
-              <a:rPr lang="en-US" smtClean="0"/>
+              <a:rPr lang="en-US"/>
               <a:t>Click to edit Master text styles</a:t>
             </a:r>
           </a:p>
@@ -2121,8 +2263,8 @@
         </p:nvSpPr>
         <p:spPr>
           <a:xfrm>
-            <a:off x="9290059" y="3479800"/>
-            <a:ext cx="8083551" cy="6322061"/>
+            <a:off x="9783594" y="1940777"/>
+            <a:ext cx="8512990" cy="3525976"/>
           </a:xfrm>
         </p:spPr>
         <p:txBody>
@@ -2159,35 +2301,35 @@
           <a:p>
             <a:pPr lvl="0"/>
             <a:r>
-              <a:rPr lang="en-US" smtClean="0"/>
+              <a:rPr lang="en-US"/>
               <a:t>Click to edit Master text styles</a:t>
             </a:r>
           </a:p>
           <a:p>
             <a:pPr lvl="1"/>
             <a:r>
-              <a:rPr lang="en-US" smtClean="0"/>
+              <a:rPr lang="en-US"/>
               <a:t>Second level</a:t>
             </a:r>
           </a:p>
           <a:p>
             <a:pPr lvl="2"/>
             <a:r>
-              <a:rPr lang="en-US" smtClean="0"/>
+              <a:rPr lang="en-US"/>
               <a:t>Third level</a:t>
             </a:r>
           </a:p>
           <a:p>
             <a:pPr lvl="3"/>
             <a:r>
-              <a:rPr lang="en-US" smtClean="0"/>
+              <a:rPr lang="en-US"/>
               <a:t>Fourth level</a:t>
             </a:r>
           </a:p>
           <a:p>
             <a:pPr lvl="4"/>
             <a:r>
-              <a:rPr lang="en-US" smtClean="0"/>
+              <a:rPr lang="en-US"/>
               <a:t>Fifth level</a:t>
             </a:r>
             <a:endParaRPr lang="en-GB"/>
@@ -2212,7 +2354,7 @@
             <a:fld id="{D9C21BDE-47B6-43FF-A3A5-B9B58F4B646D}" type="datetimeFigureOut">
               <a:rPr lang="en-US" smtClean="0"/>
               <a:pPr/>
-              <a:t>11/14/17</a:t>
+              <a:t>1/8/21</a:t>
             </a:fld>
             <a:endParaRPr lang="en-GB"/>
           </a:p>
@@ -2302,7 +2444,7 @@
           <a:lstStyle/>
           <a:p>
             <a:r>
-              <a:rPr lang="en-US" smtClean="0"/>
+              <a:rPr lang="en-US"/>
               <a:t>Click to edit Master title style</a:t>
             </a:r>
             <a:endParaRPr lang="en-GB"/>
@@ -2327,7 +2469,7 @@
             <a:fld id="{D9C21BDE-47B6-43FF-A3A5-B9B58F4B646D}" type="datetimeFigureOut">
               <a:rPr lang="en-US" smtClean="0"/>
               <a:pPr/>
-              <a:t>11/14/17</a:t>
+              <a:t>1/8/21</a:t>
             </a:fld>
             <a:endParaRPr lang="en-GB"/>
           </a:p>
@@ -2419,7 +2561,7 @@
             <a:fld id="{D9C21BDE-47B6-43FF-A3A5-B9B58F4B646D}" type="datetimeFigureOut">
               <a:rPr lang="en-US" smtClean="0"/>
               <a:pPr/>
-              <a:t>11/14/17</a:t>
+              <a:t>1/8/21</a:t>
             </a:fld>
             <a:endParaRPr lang="en-GB"/>
           </a:p>
@@ -2505,8 +2647,8 @@
         </p:nvSpPr>
         <p:spPr>
           <a:xfrm>
-            <a:off x="914408" y="436884"/>
-            <a:ext cx="6016627" cy="1859281"/>
+            <a:off x="963008" y="243666"/>
+            <a:ext cx="6336259" cy="1036969"/>
           </a:xfrm>
         </p:spPr>
         <p:txBody>
@@ -2518,7 +2660,7 @@
           </a:lstStyle>
           <a:p>
             <a:r>
-              <a:rPr lang="en-US" smtClean="0"/>
+              <a:rPr lang="en-US"/>
               <a:t>Click to edit Master title style</a:t>
             </a:r>
             <a:endParaRPr lang="en-GB"/>
@@ -2537,8 +2679,8 @@
         </p:nvSpPr>
         <p:spPr>
           <a:xfrm>
-            <a:off x="7150101" y="436887"/>
-            <a:ext cx="10223500" cy="9364981"/>
+            <a:off x="7529951" y="243669"/>
+            <a:ext cx="10766624" cy="5223091"/>
           </a:xfrm>
         </p:spPr>
         <p:txBody>
@@ -2575,35 +2717,35 @@
           <a:p>
             <a:pPr lvl="0"/>
             <a:r>
-              <a:rPr lang="en-US" smtClean="0"/>
+              <a:rPr lang="en-US"/>
               <a:t>Click to edit Master text styles</a:t>
             </a:r>
           </a:p>
           <a:p>
             <a:pPr lvl="1"/>
             <a:r>
-              <a:rPr lang="en-US" smtClean="0"/>
+              <a:rPr lang="en-US"/>
               <a:t>Second level</a:t>
             </a:r>
           </a:p>
           <a:p>
             <a:pPr lvl="2"/>
             <a:r>
-              <a:rPr lang="en-US" smtClean="0"/>
+              <a:rPr lang="en-US"/>
               <a:t>Third level</a:t>
             </a:r>
           </a:p>
           <a:p>
             <a:pPr lvl="3"/>
             <a:r>
-              <a:rPr lang="en-US" smtClean="0"/>
+              <a:rPr lang="en-US"/>
               <a:t>Fourth level</a:t>
             </a:r>
           </a:p>
           <a:p>
             <a:pPr lvl="4"/>
             <a:r>
-              <a:rPr lang="en-US" smtClean="0"/>
+              <a:rPr lang="en-US"/>
               <a:t>Fifth level</a:t>
             </a:r>
             <a:endParaRPr lang="en-GB"/>
@@ -2622,8 +2764,8 @@
         </p:nvSpPr>
         <p:spPr>
           <a:xfrm>
-            <a:off x="914408" y="2296167"/>
-            <a:ext cx="6016627" cy="7505701"/>
+            <a:off x="963008" y="1280637"/>
+            <a:ext cx="6336259" cy="4186123"/>
           </a:xfrm>
         </p:spPr>
         <p:txBody>
@@ -2669,7 +2811,7 @@
           <a:p>
             <a:pPr lvl="0"/>
             <a:r>
-              <a:rPr lang="en-US" smtClean="0"/>
+              <a:rPr lang="en-US"/>
               <a:t>Click to edit Master text styles</a:t>
             </a:r>
           </a:p>
@@ -2693,7 +2835,7 @@
             <a:fld id="{D9C21BDE-47B6-43FF-A3A5-B9B58F4B646D}" type="datetimeFigureOut">
               <a:rPr lang="en-US" smtClean="0"/>
               <a:pPr/>
-              <a:t>11/14/17</a:t>
+              <a:t>1/8/21</a:t>
             </a:fld>
             <a:endParaRPr lang="en-GB"/>
           </a:p>
@@ -2779,8 +2921,8 @@
         </p:nvSpPr>
         <p:spPr>
           <a:xfrm>
-            <a:off x="3584576" y="7680963"/>
-            <a:ext cx="10972800" cy="906782"/>
+            <a:off x="3775007" y="4283873"/>
+            <a:ext cx="11555730" cy="505736"/>
           </a:xfrm>
         </p:spPr>
         <p:txBody>
@@ -2792,7 +2934,7 @@
           </a:lstStyle>
           <a:p>
             <a:r>
-              <a:rPr lang="en-US" smtClean="0"/>
+              <a:rPr lang="en-US"/>
               <a:t>Click to edit Master title style</a:t>
             </a:r>
             <a:endParaRPr lang="en-GB"/>
@@ -2811,8 +2953,8 @@
         </p:nvSpPr>
         <p:spPr>
           <a:xfrm>
-            <a:off x="3584576" y="980440"/>
-            <a:ext cx="10972800" cy="6583680"/>
+            <a:off x="3775007" y="546818"/>
+            <a:ext cx="11555730" cy="3671888"/>
           </a:xfrm>
         </p:spPr>
         <p:txBody>
@@ -2872,8 +3014,8 @@
         </p:nvSpPr>
         <p:spPr>
           <a:xfrm>
-            <a:off x="3584576" y="8587746"/>
-            <a:ext cx="10972800" cy="1287781"/>
+            <a:off x="3775007" y="4789612"/>
+            <a:ext cx="11555730" cy="718230"/>
           </a:xfrm>
         </p:spPr>
         <p:txBody>
@@ -2919,7 +3061,7 @@
           <a:p>
             <a:pPr lvl="0"/>
             <a:r>
-              <a:rPr lang="en-US" smtClean="0"/>
+              <a:rPr lang="en-US"/>
               <a:t>Click to edit Master text styles</a:t>
             </a:r>
           </a:p>
@@ -2943,7 +3085,7 @@
             <a:fld id="{D9C21BDE-47B6-43FF-A3A5-B9B58F4B646D}" type="datetimeFigureOut">
               <a:rPr lang="en-US" smtClean="0"/>
               <a:pPr/>
-              <a:t>11/14/17</a:t>
+              <a:t>1/8/21</a:t>
             </a:fld>
             <a:endParaRPr lang="en-GB"/>
           </a:p>
@@ -3034,8 +3176,8 @@
         </p:nvSpPr>
         <p:spPr>
           <a:xfrm>
-            <a:off x="914400" y="439422"/>
-            <a:ext cx="16459200" cy="1828800"/>
+            <a:off x="962988" y="245078"/>
+            <a:ext cx="17333595" cy="1019969"/>
           </a:xfrm>
           <a:prstGeom prst="rect">
             <a:avLst/>
@@ -3048,7 +3190,7 @@
           <a:lstStyle/>
           <a:p>
             <a:r>
-              <a:rPr lang="en-US" smtClean="0"/>
+              <a:rPr lang="en-US"/>
               <a:t>Click to edit Master title style</a:t>
             </a:r>
             <a:endParaRPr lang="en-GB"/>
@@ -3067,8 +3209,8 @@
         </p:nvSpPr>
         <p:spPr>
           <a:xfrm>
-            <a:off x="914400" y="2560324"/>
-            <a:ext cx="16459200" cy="7241540"/>
+            <a:off x="962988" y="1427959"/>
+            <a:ext cx="17333595" cy="4038793"/>
           </a:xfrm>
           <a:prstGeom prst="rect">
             <a:avLst/>
@@ -3082,35 +3224,35 @@
           <a:p>
             <a:pPr lvl="0"/>
             <a:r>
-              <a:rPr lang="en-US" smtClean="0"/>
+              <a:rPr lang="en-US"/>
               <a:t>Click to edit Master text styles</a:t>
             </a:r>
           </a:p>
           <a:p>
             <a:pPr lvl="1"/>
             <a:r>
-              <a:rPr lang="en-US" smtClean="0"/>
+              <a:rPr lang="en-US"/>
               <a:t>Second level</a:t>
             </a:r>
           </a:p>
           <a:p>
             <a:pPr lvl="2"/>
             <a:r>
-              <a:rPr lang="en-US" smtClean="0"/>
+              <a:rPr lang="en-US"/>
               <a:t>Third level</a:t>
             </a:r>
           </a:p>
           <a:p>
             <a:pPr lvl="3"/>
             <a:r>
-              <a:rPr lang="en-US" smtClean="0"/>
+              <a:rPr lang="en-US"/>
               <a:t>Fourth level</a:t>
             </a:r>
           </a:p>
           <a:p>
             <a:pPr lvl="4"/>
             <a:r>
-              <a:rPr lang="en-US" smtClean="0"/>
+              <a:rPr lang="en-US"/>
               <a:t>Fifth level</a:t>
             </a:r>
             <a:endParaRPr lang="en-GB"/>
@@ -3129,8 +3271,8 @@
         </p:nvSpPr>
         <p:spPr>
           <a:xfrm>
-            <a:off x="914400" y="10170166"/>
-            <a:ext cx="4267200" cy="584200"/>
+            <a:off x="962980" y="5672167"/>
+            <a:ext cx="4493895" cy="325824"/>
           </a:xfrm>
           <a:prstGeom prst="rect">
             <a:avLst/>
@@ -3153,7 +3295,7 @@
             <a:fld id="{D9C21BDE-47B6-43FF-A3A5-B9B58F4B646D}" type="datetimeFigureOut">
               <a:rPr lang="en-US" smtClean="0"/>
               <a:pPr/>
-              <a:t>11/14/17</a:t>
+              <a:t>1/8/21</a:t>
             </a:fld>
             <a:endParaRPr lang="en-GB"/>
           </a:p>
@@ -3171,8 +3313,8 @@
         </p:nvSpPr>
         <p:spPr>
           <a:xfrm>
-            <a:off x="6248400" y="10170166"/>
-            <a:ext cx="5791200" cy="584200"/>
+            <a:off x="6580356" y="5672167"/>
+            <a:ext cx="6098858" cy="325824"/>
           </a:xfrm>
           <a:prstGeom prst="rect">
             <a:avLst/>
@@ -3208,8 +3350,8 @@
         </p:nvSpPr>
         <p:spPr>
           <a:xfrm>
-            <a:off x="13106400" y="10170166"/>
-            <a:ext cx="4267200" cy="584200"/>
+            <a:off x="13802694" y="5672167"/>
+            <a:ext cx="4493895" cy="325824"/>
           </a:xfrm>
           <a:prstGeom prst="rect">
             <a:avLst/>
@@ -3524,34 +3666,181 @@
           <a:chExt cx="0" cy="0"/>
         </a:xfrm>
       </p:grpSpPr>
-      <p:sp>
-        <p:nvSpPr>
-          <p:cNvPr id="30" name="Oval 29"/>
-          <p:cNvSpPr/>
+      <p:pic>
+        <p:nvPicPr>
+          <p:cNvPr id="185" name="Picture 184" descr="Background pattern&#10;&#10;Description automatically generated">
+            <a:extLst>
+              <a:ext uri="{FF2B5EF4-FFF2-40B4-BE49-F238E27FC236}">
+                <a16:creationId xmlns:a16="http://schemas.microsoft.com/office/drawing/2014/main" id="{7790DC13-079E-474B-B633-69522F6646E8}"/>
+              </a:ext>
+            </a:extLst>
+          </p:cNvPr>
+          <p:cNvPicPr>
+            <a:picLocks noChangeAspect="1"/>
+          </p:cNvPicPr>
           <p:nvPr/>
-        </p:nvSpPr>
+        </p:nvPicPr>
+        <p:blipFill rotWithShape="1">
+          <a:blip r:embed="rId3">
+            <a:extLst>
+              <a:ext uri="{28A0092B-C50C-407E-A947-70E740481C1C}">
+                <a14:useLocalDpi xmlns:a14="http://schemas.microsoft.com/office/drawing/2010/main" val="0"/>
+              </a:ext>
+            </a:extLst>
+          </a:blip>
+          <a:srcRect l="77422" t="11237" r="14769" b="74999"/>
+          <a:stretch/>
+        </p:blipFill>
         <p:spPr>
           <a:xfrm>
-            <a:off x="9071992" y="1886000"/>
-            <a:ext cx="6912768" cy="5872732"/>
-          </a:xfrm>
-          <a:prstGeom prst="ellipse">
+            <a:off x="10257190" y="595875"/>
+            <a:ext cx="1896684" cy="2346957"/>
+          </a:xfrm>
+          <a:prstGeom prst="rect">
+            <a:avLst/>
+          </a:prstGeom>
+          <a:effectLst>
+            <a:softEdge rad="254000"/>
+          </a:effectLst>
+        </p:spPr>
+      </p:pic>
+      <p:pic>
+        <p:nvPicPr>
+          <p:cNvPr id="183" name="Picture 182" descr="Background pattern&#10;&#10;Description automatically generated">
+            <a:extLst>
+              <a:ext uri="{FF2B5EF4-FFF2-40B4-BE49-F238E27FC236}">
+                <a16:creationId xmlns:a16="http://schemas.microsoft.com/office/drawing/2014/main" id="{BE7F3BE8-2F88-1846-8720-793B123AE412}"/>
+              </a:ext>
+            </a:extLst>
+          </p:cNvPr>
+          <p:cNvPicPr>
+            <a:picLocks noChangeAspect="1"/>
+          </p:cNvPicPr>
+          <p:nvPr/>
+        </p:nvPicPr>
+        <p:blipFill rotWithShape="1">
+          <a:blip r:embed="rId3">
+            <a:extLst>
+              <a:ext uri="{28A0092B-C50C-407E-A947-70E740481C1C}">
+                <a14:useLocalDpi xmlns:a14="http://schemas.microsoft.com/office/drawing/2010/main" val="0"/>
+              </a:ext>
+            </a:extLst>
+          </a:blip>
+          <a:srcRect l="46162" t="10770" r="46029" b="74479"/>
+          <a:stretch/>
+        </p:blipFill>
+        <p:spPr>
+          <a:xfrm>
+            <a:off x="6220923" y="2488767"/>
+            <a:ext cx="1896684" cy="2515355"/>
+          </a:xfrm>
+          <a:prstGeom prst="rect">
+            <a:avLst/>
+          </a:prstGeom>
+          <a:effectLst>
+            <a:softEdge rad="254000"/>
+          </a:effectLst>
+        </p:spPr>
+      </p:pic>
+      <p:pic>
+        <p:nvPicPr>
+          <p:cNvPr id="182" name="Picture 181" descr="Background pattern&#10;&#10;Description automatically generated">
+            <a:extLst>
+              <a:ext uri="{FF2B5EF4-FFF2-40B4-BE49-F238E27FC236}">
+                <a16:creationId xmlns:a16="http://schemas.microsoft.com/office/drawing/2014/main" id="{B5B97ADF-4197-2B47-A0AC-A4447C194BA6}"/>
+              </a:ext>
+            </a:extLst>
+          </p:cNvPr>
+          <p:cNvPicPr>
+            <a:picLocks noChangeAspect="1"/>
+          </p:cNvPicPr>
+          <p:nvPr/>
+        </p:nvPicPr>
+        <p:blipFill rotWithShape="1">
+          <a:blip r:embed="rId3">
+            <a:extLst>
+              <a:ext uri="{28A0092B-C50C-407E-A947-70E740481C1C}">
+                <a14:useLocalDpi xmlns:a14="http://schemas.microsoft.com/office/drawing/2010/main" val="0"/>
+              </a:ext>
+            </a:extLst>
+          </a:blip>
+          <a:srcRect l="6147" t="341" r="72268" b="72141"/>
+          <a:stretch/>
+        </p:blipFill>
+        <p:spPr>
+          <a:xfrm>
+            <a:off x="632282" y="262871"/>
+            <a:ext cx="4388982" cy="3927784"/>
+          </a:xfrm>
+          <a:prstGeom prst="rect">
+            <a:avLst/>
+          </a:prstGeom>
+          <a:effectLst>
+            <a:softEdge rad="254000"/>
+          </a:effectLst>
+        </p:spPr>
+      </p:pic>
+      <p:pic>
+        <p:nvPicPr>
+          <p:cNvPr id="181" name="Picture 180" descr="Background pattern&#10;&#10;Description automatically generated">
+            <a:extLst>
+              <a:ext uri="{FF2B5EF4-FFF2-40B4-BE49-F238E27FC236}">
+                <a16:creationId xmlns:a16="http://schemas.microsoft.com/office/drawing/2014/main" id="{DDB35A75-B4A6-AF48-A9AB-3B21D1A2F877}"/>
+              </a:ext>
+            </a:extLst>
+          </p:cNvPr>
+          <p:cNvPicPr>
+            <a:picLocks noChangeAspect="1"/>
+          </p:cNvPicPr>
+          <p:nvPr/>
+        </p:nvPicPr>
+        <p:blipFill rotWithShape="1">
+          <a:blip r:embed="rId3">
+            <a:extLst>
+              <a:ext uri="{28A0092B-C50C-407E-A947-70E740481C1C}">
+                <a14:useLocalDpi xmlns:a14="http://schemas.microsoft.com/office/drawing/2010/main" val="0"/>
+              </a:ext>
+            </a:extLst>
+          </a:blip>
+          <a:srcRect l="7798" t="41329" r="69318" b="31153"/>
+          <a:stretch/>
+        </p:blipFill>
+        <p:spPr>
+          <a:xfrm>
+            <a:off x="14538263" y="268303"/>
+            <a:ext cx="4653149" cy="3927784"/>
+          </a:xfrm>
+          <a:prstGeom prst="rect">
+            <a:avLst/>
+          </a:prstGeom>
+          <a:effectLst>
+            <a:softEdge rad="254000"/>
+          </a:effectLst>
+        </p:spPr>
+      </p:pic>
+      <p:sp>
+        <p:nvSpPr>
+          <p:cNvPr id="67" name="TextBox 66"/>
+          <p:cNvSpPr txBox="1"/>
+          <p:nvPr/>
+        </p:nvSpPr>
+        <p:spPr>
+          <a:xfrm>
+            <a:off x="163988" y="2036043"/>
+            <a:ext cx="3165703" cy="821512"/>
+          </a:xfrm>
+          <a:prstGeom prst="rect">
             <a:avLst/>
           </a:prstGeom>
           <a:gradFill flip="none" rotWithShape="1">
             <a:gsLst>
               <a:gs pos="100000">
-                <a:srgbClr val="FFFFFF"/>
+                <a:schemeClr val="bg1">
+                  <a:alpha val="0"/>
+                </a:schemeClr>
               </a:gs>
               <a:gs pos="39000">
-                <a:schemeClr val="bg2">
-                  <a:lumMod val="75000"/>
-                </a:schemeClr>
-              </a:gs>
-              <a:gs pos="75000">
-                <a:schemeClr val="bg2">
-                  <a:lumMod val="90000"/>
-                </a:schemeClr>
+                <a:schemeClr val="bg1"/>
               </a:gs>
             </a:gsLst>
             <a:path path="shape">
@@ -3561,6 +3850,290 @@
           </a:gradFill>
           <a:ln>
             <a:noFill/>
+          </a:ln>
+          <a:effectLst>
+            <a:softEdge rad="0"/>
+          </a:effectLst>
+        </p:spPr>
+        <p:txBody>
+          <a:bodyPr wrap="square" tIns="0" rtlCol="0" anchor="ctr" anchorCtr="1">
+            <a:noAutofit/>
+          </a:bodyPr>
+          <a:lstStyle/>
+          <a:p>
+            <a:pPr algn="ctr"/>
+            <a:r>
+              <a:rPr lang="en-US" sz="2800" b="1" dirty="0">
+                <a:latin typeface="Helvetica" pitchFamily="2" charset="0"/>
+              </a:rPr>
+              <a:t>Benign prostate</a:t>
+            </a:r>
+          </a:p>
+        </p:txBody>
+      </p:sp>
+      <p:sp>
+        <p:nvSpPr>
+          <p:cNvPr id="57" name="TextBox 56"/>
+          <p:cNvSpPr txBox="1"/>
+          <p:nvPr/>
+        </p:nvSpPr>
+        <p:spPr>
+          <a:xfrm>
+            <a:off x="14075384" y="3228257"/>
+            <a:ext cx="2879048" cy="1046650"/>
+          </a:xfrm>
+          <a:prstGeom prst="rect">
+            <a:avLst/>
+          </a:prstGeom>
+          <a:gradFill flip="none" rotWithShape="1">
+            <a:gsLst>
+              <a:gs pos="100000">
+                <a:schemeClr val="bg1">
+                  <a:alpha val="0"/>
+                </a:schemeClr>
+              </a:gs>
+              <a:gs pos="58000">
+                <a:schemeClr val="bg1"/>
+              </a:gs>
+            </a:gsLst>
+            <a:path path="shape">
+              <a:fillToRect l="50000" t="50000" r="50000" b="50000"/>
+            </a:path>
+            <a:tileRect/>
+          </a:gradFill>
+          <a:ln>
+            <a:noFill/>
+          </a:ln>
+          <a:effectLst>
+            <a:softEdge rad="0"/>
+          </a:effectLst>
+        </p:spPr>
+        <p:txBody>
+          <a:bodyPr wrap="square" tIns="0" rtlCol="0" anchor="ctr" anchorCtr="1">
+            <a:noAutofit/>
+          </a:bodyPr>
+          <a:lstStyle>
+            <a:defPPr>
+              <a:defRPr lang="en-US"/>
+            </a:defPPr>
+            <a:lvl1pPr algn="ctr">
+              <a:defRPr sz="2400" b="1">
+                <a:latin typeface="Helvetica" pitchFamily="2" charset="0"/>
+              </a:defRPr>
+            </a:lvl1pPr>
+          </a:lstStyle>
+          <a:p>
+            <a:r>
+              <a:rPr lang="en-US" sz="2800" dirty="0"/>
+              <a:t>Metastatic primary tumour</a:t>
+            </a:r>
+          </a:p>
+        </p:txBody>
+      </p:sp>
+      <p:sp>
+        <p:nvSpPr>
+          <p:cNvPr id="58" name="TextBox 57"/>
+          <p:cNvSpPr txBox="1"/>
+          <p:nvPr/>
+        </p:nvSpPr>
+        <p:spPr>
+          <a:xfrm>
+            <a:off x="14780362" y="35391"/>
+            <a:ext cx="2304256" cy="881970"/>
+          </a:xfrm>
+          <a:prstGeom prst="rect">
+            <a:avLst/>
+          </a:prstGeom>
+          <a:gradFill flip="none" rotWithShape="1">
+            <a:gsLst>
+              <a:gs pos="100000">
+                <a:schemeClr val="bg1">
+                  <a:alpha val="0"/>
+                </a:schemeClr>
+              </a:gs>
+              <a:gs pos="39000">
+                <a:schemeClr val="bg1"/>
+              </a:gs>
+            </a:gsLst>
+            <a:path path="shape">
+              <a:fillToRect l="50000" t="50000" r="50000" b="50000"/>
+            </a:path>
+            <a:tileRect/>
+          </a:gradFill>
+          <a:ln>
+            <a:noFill/>
+          </a:ln>
+          <a:effectLst>
+            <a:softEdge rad="0"/>
+          </a:effectLst>
+        </p:spPr>
+        <p:txBody>
+          <a:bodyPr wrap="square" tIns="0" rtlCol="0" anchor="ctr" anchorCtr="1">
+            <a:noAutofit/>
+          </a:bodyPr>
+          <a:lstStyle>
+            <a:defPPr>
+              <a:defRPr lang="en-US"/>
+            </a:defPPr>
+            <a:lvl1pPr algn="ctr">
+              <a:defRPr sz="2400" b="1">
+                <a:latin typeface="Helvetica" pitchFamily="2" charset="0"/>
+              </a:defRPr>
+            </a:lvl1pPr>
+          </a:lstStyle>
+          <a:p>
+            <a:r>
+              <a:rPr lang="en-US" sz="2800" dirty="0"/>
+              <a:t>Metastasis</a:t>
+            </a:r>
+          </a:p>
+        </p:txBody>
+      </p:sp>
+      <p:sp>
+        <p:nvSpPr>
+          <p:cNvPr id="59" name="TextBox 58"/>
+          <p:cNvSpPr txBox="1"/>
+          <p:nvPr/>
+        </p:nvSpPr>
+        <p:spPr>
+          <a:xfrm>
+            <a:off x="9360076" y="283637"/>
+            <a:ext cx="3501698" cy="648421"/>
+          </a:xfrm>
+          <a:prstGeom prst="rect">
+            <a:avLst/>
+          </a:prstGeom>
+          <a:gradFill flip="none" rotWithShape="1">
+            <a:gsLst>
+              <a:gs pos="100000">
+                <a:schemeClr val="bg1">
+                  <a:alpha val="0"/>
+                </a:schemeClr>
+              </a:gs>
+              <a:gs pos="39000">
+                <a:schemeClr val="bg1"/>
+              </a:gs>
+            </a:gsLst>
+            <a:path path="shape">
+              <a:fillToRect l="50000" t="50000" r="50000" b="50000"/>
+            </a:path>
+            <a:tileRect/>
+          </a:gradFill>
+          <a:ln>
+            <a:noFill/>
+          </a:ln>
+          <a:effectLst>
+            <a:softEdge rad="0"/>
+          </a:effectLst>
+        </p:spPr>
+        <p:txBody>
+          <a:bodyPr wrap="square" tIns="0" rtlCol="0" anchor="ctr" anchorCtr="1">
+            <a:noAutofit/>
+          </a:bodyPr>
+          <a:lstStyle>
+            <a:defPPr>
+              <a:defRPr lang="en-US"/>
+            </a:defPPr>
+            <a:lvl1pPr algn="ctr">
+              <a:defRPr sz="2400" b="1">
+                <a:latin typeface="Helvetica" pitchFamily="2" charset="0"/>
+              </a:defRPr>
+            </a:lvl1pPr>
+          </a:lstStyle>
+          <a:p>
+            <a:r>
+              <a:rPr lang="en-US" sz="2800" dirty="0"/>
+              <a:t>Primary tumour</a:t>
+            </a:r>
+          </a:p>
+        </p:txBody>
+      </p:sp>
+      <p:sp>
+        <p:nvSpPr>
+          <p:cNvPr id="108" name="TextBox 107"/>
+          <p:cNvSpPr txBox="1"/>
+          <p:nvPr/>
+        </p:nvSpPr>
+        <p:spPr>
+          <a:xfrm>
+            <a:off x="6377293" y="3753737"/>
+            <a:ext cx="1368152" cy="818337"/>
+          </a:xfrm>
+          <a:prstGeom prst="rect">
+            <a:avLst/>
+          </a:prstGeom>
+          <a:gradFill flip="none" rotWithShape="1">
+            <a:gsLst>
+              <a:gs pos="100000">
+                <a:schemeClr val="bg1">
+                  <a:alpha val="0"/>
+                </a:schemeClr>
+              </a:gs>
+              <a:gs pos="39000">
+                <a:schemeClr val="bg1"/>
+              </a:gs>
+            </a:gsLst>
+            <a:path path="shape">
+              <a:fillToRect l="50000" t="50000" r="50000" b="50000"/>
+            </a:path>
+            <a:tileRect/>
+          </a:gradFill>
+          <a:ln>
+            <a:noFill/>
+          </a:ln>
+          <a:effectLst>
+            <a:softEdge rad="0"/>
+          </a:effectLst>
+        </p:spPr>
+        <p:txBody>
+          <a:bodyPr wrap="square" tIns="0" rtlCol="0" anchor="ctr" anchorCtr="1">
+            <a:noAutofit/>
+          </a:bodyPr>
+          <a:lstStyle>
+            <a:defPPr>
+              <a:defRPr lang="en-US"/>
+            </a:defPPr>
+            <a:lvl1pPr algn="ctr">
+              <a:defRPr sz="2400" b="1">
+                <a:latin typeface="Helvetica" pitchFamily="2" charset="0"/>
+              </a:defRPr>
+            </a:lvl1pPr>
+          </a:lstStyle>
+          <a:p>
+            <a:r>
+              <a:rPr lang="en-US" sz="2800" dirty="0"/>
+              <a:t>HGPIN</a:t>
+            </a:r>
+          </a:p>
+        </p:txBody>
+      </p:sp>
+      <p:sp>
+        <p:nvSpPr>
+          <p:cNvPr id="54" name="Oval 53"/>
+          <p:cNvSpPr/>
+          <p:nvPr/>
+        </p:nvSpPr>
+        <p:spPr>
+          <a:xfrm>
+            <a:off x="3363171" y="2362446"/>
+            <a:ext cx="108000" cy="108000"/>
+          </a:xfrm>
+          <a:prstGeom prst="ellipse">
+            <a:avLst/>
+          </a:prstGeom>
+          <a:solidFill>
+            <a:schemeClr val="tx1">
+              <a:lumMod val="75000"/>
+              <a:lumOff val="25000"/>
+            </a:schemeClr>
+          </a:solidFill>
+          <a:ln w="63500">
+            <a:solidFill>
+              <a:schemeClr val="tx1">
+                <a:lumMod val="75000"/>
+                <a:lumOff val="25000"/>
+              </a:schemeClr>
+            </a:solidFill>
           </a:ln>
           <a:effectLst/>
         </p:spPr>
@@ -3583,40 +4156,345 @@
           <a:lstStyle/>
           <a:p>
             <a:pPr algn="ctr"/>
-            <a:endParaRPr lang="en-GB"/>
-          </a:p>
-        </p:txBody>
-      </p:sp>
-      <p:sp>
-        <p:nvSpPr>
-          <p:cNvPr id="31" name="Oval 30"/>
+            <a:endParaRPr lang="en-US"/>
+          </a:p>
+        </p:txBody>
+      </p:sp>
+      <p:sp>
+        <p:nvSpPr>
+          <p:cNvPr id="3" name="Arc 2">
+            <a:extLst>
+              <a:ext uri="{FF2B5EF4-FFF2-40B4-BE49-F238E27FC236}">
+                <a16:creationId xmlns:a16="http://schemas.microsoft.com/office/drawing/2014/main" id="{756AB332-D807-5F41-8A6E-C68B873D2884}"/>
+              </a:ext>
+            </a:extLst>
+          </p:cNvPr>
           <p:cNvSpPr/>
           <p:nvPr/>
         </p:nvSpPr>
         <p:spPr>
+          <a:xfrm rot="17370461" flipH="1">
+            <a:off x="4545708" y="421485"/>
+            <a:ext cx="1294489" cy="4405610"/>
+          </a:xfrm>
+          <a:prstGeom prst="arc">
+            <a:avLst>
+              <a:gd name="adj1" fmla="val 16996825"/>
+              <a:gd name="adj2" fmla="val 4735571"/>
+            </a:avLst>
+          </a:prstGeom>
+          <a:ln w="63500">
+            <a:solidFill>
+              <a:schemeClr val="tx1">
+                <a:lumMod val="75000"/>
+                <a:lumOff val="25000"/>
+              </a:schemeClr>
+            </a:solidFill>
+            <a:prstDash val="solid"/>
+            <a:tailEnd type="triangle" w="lg" len="lg"/>
+            <a:extLst>
+              <a:ext uri="{C807C97D-BFC1-408E-A445-0C87EB9F89A2}">
+                <ask:lineSketchStyleProps xmlns:ask="http://schemas.microsoft.com/office/drawing/2018/sketchyshapes" sd="1219033472">
+                  <a:custGeom>
+                    <a:avLst/>
+                    <a:gdLst>
+                      <a:gd name="connsiteX0" fmla="*/ 794265 w 1294489"/>
+                      <a:gd name="connsiteY0" fmla="*/ 33508 h 2563805"/>
+                      <a:gd name="connsiteX1" fmla="*/ 1291364 w 1294489"/>
+                      <a:gd name="connsiteY1" fmla="*/ 1156059 h 2563805"/>
+                      <a:gd name="connsiteX2" fmla="*/ 1124182 w 1294489"/>
+                      <a:gd name="connsiteY2" fmla="*/ 2148509 h 2563805"/>
+                      <a:gd name="connsiteX3" fmla="*/ 876175 w 1294489"/>
+                      <a:gd name="connsiteY3" fmla="*/ 1697874 h 2563805"/>
+                      <a:gd name="connsiteX4" fmla="*/ 647245 w 1294489"/>
+                      <a:gd name="connsiteY4" fmla="*/ 1281903 h 2563805"/>
+                      <a:gd name="connsiteX5" fmla="*/ 693311 w 1294489"/>
+                      <a:gd name="connsiteY5" fmla="*/ 890739 h 2563805"/>
+                      <a:gd name="connsiteX6" fmla="*/ 745258 w 1294489"/>
+                      <a:gd name="connsiteY6" fmla="*/ 449640 h 2563805"/>
+                      <a:gd name="connsiteX7" fmla="*/ 794265 w 1294489"/>
+                      <a:gd name="connsiteY7" fmla="*/ 33508 h 2563805"/>
+                      <a:gd name="connsiteX0" fmla="*/ 794265 w 1294489"/>
+                      <a:gd name="connsiteY0" fmla="*/ 33508 h 2563805"/>
+                      <a:gd name="connsiteX1" fmla="*/ 1291364 w 1294489"/>
+                      <a:gd name="connsiteY1" fmla="*/ 1156059 h 2563805"/>
+                      <a:gd name="connsiteX2" fmla="*/ 1124182 w 1294489"/>
+                      <a:gd name="connsiteY2" fmla="*/ 2148509 h 2563805"/>
+                    </a:gdLst>
+                    <a:ahLst/>
+                    <a:cxnLst>
+                      <a:cxn ang="0">
+                        <a:pos x="connsiteX0" y="connsiteY0"/>
+                      </a:cxn>
+                      <a:cxn ang="0">
+                        <a:pos x="connsiteX1" y="connsiteY1"/>
+                      </a:cxn>
+                      <a:cxn ang="0">
+                        <a:pos x="connsiteX2" y="connsiteY2"/>
+                      </a:cxn>
+                    </a:cxnLst>
+                    <a:rect l="l" t="t" r="r" b="b"/>
+                    <a:pathLst>
+                      <a:path w="1294489" h="2563805" stroke="0" extrusionOk="0">
+                        <a:moveTo>
+                          <a:pt x="794265" y="33508"/>
+                        </a:moveTo>
+                        <a:cubicBezTo>
+                          <a:pt x="946985" y="85897"/>
+                          <a:pt x="1182133" y="640423"/>
+                          <a:pt x="1291364" y="1156059"/>
+                        </a:cubicBezTo>
+                        <a:cubicBezTo>
+                          <a:pt x="1377833" y="1533310"/>
+                          <a:pt x="1195075" y="1881539"/>
+                          <a:pt x="1124182" y="2148509"/>
+                        </a:cubicBezTo>
+                        <a:cubicBezTo>
+                          <a:pt x="1012365" y="1994064"/>
+                          <a:pt x="980697" y="1831022"/>
+                          <a:pt x="876175" y="1697874"/>
+                        </a:cubicBezTo>
+                        <a:cubicBezTo>
+                          <a:pt x="771653" y="1564726"/>
+                          <a:pt x="727635" y="1401724"/>
+                          <a:pt x="647245" y="1281903"/>
+                        </a:cubicBezTo>
+                        <a:cubicBezTo>
+                          <a:pt x="659065" y="1118417"/>
+                          <a:pt x="705752" y="977080"/>
+                          <a:pt x="693311" y="890739"/>
+                        </a:cubicBezTo>
+                        <a:cubicBezTo>
+                          <a:pt x="680871" y="804398"/>
+                          <a:pt x="736452" y="628881"/>
+                          <a:pt x="745258" y="449640"/>
+                        </a:cubicBezTo>
+                        <a:cubicBezTo>
+                          <a:pt x="754064" y="270399"/>
+                          <a:pt x="808238" y="175578"/>
+                          <a:pt x="794265" y="33508"/>
+                        </a:cubicBezTo>
+                        <a:close/>
+                      </a:path>
+                      <a:path w="1294489" h="2563805" fill="none" extrusionOk="0">
+                        <a:moveTo>
+                          <a:pt x="794265" y="33508"/>
+                        </a:moveTo>
+                        <a:cubicBezTo>
+                          <a:pt x="999433" y="265451"/>
+                          <a:pt x="1233907" y="574566"/>
+                          <a:pt x="1291364" y="1156059"/>
+                        </a:cubicBezTo>
+                        <a:cubicBezTo>
+                          <a:pt x="1314900" y="1556718"/>
+                          <a:pt x="1210566" y="1877658"/>
+                          <a:pt x="1124182" y="2148509"/>
+                        </a:cubicBezTo>
+                      </a:path>
+                    </a:pathLst>
+                  </a:custGeom>
+                  <ask:type>
+                    <ask:lineSketchNone/>
+                  </ask:type>
+                </ask:lineSketchStyleProps>
+              </a:ext>
+            </a:extLst>
+          </a:ln>
+          <a:effectLst/>
+        </p:spPr>
+        <p:style>
+          <a:lnRef idx="2">
+            <a:schemeClr val="accent1"/>
+          </a:lnRef>
+          <a:fillRef idx="0">
+            <a:schemeClr val="accent1"/>
+          </a:fillRef>
+          <a:effectRef idx="1">
+            <a:schemeClr val="accent1"/>
+          </a:effectRef>
+          <a:fontRef idx="minor">
+            <a:schemeClr val="tx1"/>
+          </a:fontRef>
+        </p:style>
+        <p:txBody>
+          <a:bodyPr rtlCol="0" anchor="ctr"/>
+          <a:lstStyle/>
+          <a:p>
+            <a:pPr algn="ctr"/>
+            <a:endParaRPr lang="en-US"/>
+          </a:p>
+        </p:txBody>
+      </p:sp>
+      <p:sp>
+        <p:nvSpPr>
+          <p:cNvPr id="75" name="Arc 74">
+            <a:extLst>
+              <a:ext uri="{FF2B5EF4-FFF2-40B4-BE49-F238E27FC236}">
+                <a16:creationId xmlns:a16="http://schemas.microsoft.com/office/drawing/2014/main" id="{A10B7945-CA5A-7E42-9080-29FE48F37483}"/>
+              </a:ext>
+            </a:extLst>
+          </p:cNvPr>
+          <p:cNvSpPr/>
+          <p:nvPr/>
+        </p:nvSpPr>
+        <p:spPr>
+          <a:xfrm rot="17512898" flipH="1">
+            <a:off x="12857660" y="-515327"/>
+            <a:ext cx="802755" cy="4550908"/>
+          </a:xfrm>
+          <a:prstGeom prst="arc">
+            <a:avLst>
+              <a:gd name="adj1" fmla="val 16752171"/>
+              <a:gd name="adj2" fmla="val 5191755"/>
+            </a:avLst>
+          </a:prstGeom>
+          <a:ln w="63500">
+            <a:solidFill>
+              <a:schemeClr val="tx1">
+                <a:lumMod val="75000"/>
+                <a:lumOff val="25000"/>
+              </a:schemeClr>
+            </a:solidFill>
+            <a:tailEnd type="triangle" w="lg" len="lg"/>
+          </a:ln>
+          <a:effectLst/>
+        </p:spPr>
+        <p:style>
+          <a:lnRef idx="2">
+            <a:schemeClr val="accent1"/>
+          </a:lnRef>
+          <a:fillRef idx="0">
+            <a:schemeClr val="accent1"/>
+          </a:fillRef>
+          <a:effectRef idx="1">
+            <a:schemeClr val="accent1"/>
+          </a:effectRef>
+          <a:fontRef idx="minor">
+            <a:schemeClr val="tx1"/>
+          </a:fontRef>
+        </p:style>
+        <p:txBody>
+          <a:bodyPr rtlCol="0" anchor="ctr"/>
+          <a:lstStyle/>
+          <a:p>
+            <a:pPr algn="ctr"/>
+            <a:endParaRPr lang="en-US"/>
+          </a:p>
+        </p:txBody>
+      </p:sp>
+      <p:sp>
+        <p:nvSpPr>
+          <p:cNvPr id="76" name="Arc 75">
+            <a:extLst>
+              <a:ext uri="{FF2B5EF4-FFF2-40B4-BE49-F238E27FC236}">
+                <a16:creationId xmlns:a16="http://schemas.microsoft.com/office/drawing/2014/main" id="{51D8D766-BD43-6343-819D-DB69F84F4C58}"/>
+              </a:ext>
+            </a:extLst>
+          </p:cNvPr>
+          <p:cNvSpPr/>
+          <p:nvPr/>
+        </p:nvSpPr>
+        <p:spPr>
+          <a:xfrm rot="16034833">
+            <a:off x="13453725" y="-2224736"/>
+            <a:ext cx="2346957" cy="8301577"/>
+          </a:xfrm>
+          <a:prstGeom prst="arc">
+            <a:avLst>
+              <a:gd name="adj1" fmla="val 17090027"/>
+              <a:gd name="adj2" fmla="val 4626746"/>
+            </a:avLst>
+          </a:prstGeom>
+          <a:ln w="63500">
+            <a:solidFill>
+              <a:schemeClr val="tx1">
+                <a:lumMod val="75000"/>
+                <a:lumOff val="25000"/>
+              </a:schemeClr>
+            </a:solidFill>
+            <a:tailEnd type="triangle" w="lg" len="lg"/>
+          </a:ln>
+          <a:effectLst/>
+        </p:spPr>
+        <p:style>
+          <a:lnRef idx="2">
+            <a:schemeClr val="accent1"/>
+          </a:lnRef>
+          <a:fillRef idx="0">
+            <a:schemeClr val="accent1"/>
+          </a:fillRef>
+          <a:effectRef idx="1">
+            <a:schemeClr val="accent1"/>
+          </a:effectRef>
+          <a:fontRef idx="minor">
+            <a:schemeClr val="tx1"/>
+          </a:fontRef>
+        </p:style>
+        <p:txBody>
+          <a:bodyPr rtlCol="0" anchor="ctr"/>
+          <a:lstStyle/>
+          <a:p>
+            <a:pPr algn="ctr"/>
+            <a:endParaRPr lang="en-US"/>
+          </a:p>
+        </p:txBody>
+      </p:sp>
+      <p:sp>
+        <p:nvSpPr>
+          <p:cNvPr id="74" name="Right Arrow 73">
+            <a:extLst>
+              <a:ext uri="{FF2B5EF4-FFF2-40B4-BE49-F238E27FC236}">
+                <a16:creationId xmlns:a16="http://schemas.microsoft.com/office/drawing/2014/main" id="{94E64797-23CF-2244-920A-740F9C487ABF}"/>
+              </a:ext>
+            </a:extLst>
+          </p:cNvPr>
+          <p:cNvSpPr/>
+          <p:nvPr/>
+        </p:nvSpPr>
+        <p:spPr>
           <a:xfrm>
-            <a:off x="11880304" y="4694312"/>
-            <a:ext cx="3312368" cy="2160240"/>
-          </a:xfrm>
-          <a:prstGeom prst="ellipse">
+            <a:off x="855663" y="4861672"/>
+            <a:ext cx="17919128" cy="1222570"/>
+          </a:xfrm>
+          <a:prstGeom prst="rightArrow">
             <a:avLst/>
           </a:prstGeom>
           <a:gradFill flip="none" rotWithShape="1">
             <a:gsLst>
-              <a:gs pos="87000">
-                <a:schemeClr val="bg2">
+              <a:gs pos="12000">
+                <a:schemeClr val="bg1">
                   <a:lumMod val="75000"/>
                 </a:schemeClr>
               </a:gs>
-              <a:gs pos="21000">
+              <a:gs pos="46000">
+                <a:schemeClr val="accent2">
+                  <a:lumMod val="75000"/>
+                  <a:alpha val="65000"/>
+                </a:schemeClr>
+              </a:gs>
+              <a:gs pos="26000">
+                <a:schemeClr val="accent6">
+                  <a:lumMod val="75000"/>
+                  <a:alpha val="50000"/>
+                </a:schemeClr>
+              </a:gs>
+              <a:gs pos="3000">
+                <a:schemeClr val="bg1"/>
+              </a:gs>
+              <a:gs pos="75000">
                 <a:schemeClr val="bg2">
-                  <a:lumMod val="50000"/>
+                  <a:lumMod val="25000"/>
+                  <a:alpha val="70000"/>
+                </a:schemeClr>
+              </a:gs>
+              <a:gs pos="91000">
+                <a:schemeClr val="bg2">
+                  <a:lumMod val="10000"/>
+                  <a:alpha val="85000"/>
                 </a:schemeClr>
               </a:gs>
             </a:gsLst>
-            <a:path path="shape">
-              <a:fillToRect l="50000" t="50000" r="50000" b="50000"/>
-            </a:path>
+            <a:lin ang="21300000" scaled="0"/>
             <a:tileRect/>
           </a:gradFill>
           <a:ln>
@@ -3643,45 +4521,174 @@
           <a:lstStyle/>
           <a:p>
             <a:pPr algn="ctr"/>
-            <a:endParaRPr lang="en-GB"/>
-          </a:p>
-        </p:txBody>
-      </p:sp>
-      <p:sp>
-        <p:nvSpPr>
-          <p:cNvPr id="33" name="Up Arrow 32"/>
+            <a:endParaRPr lang="en-US">
+              <a:latin typeface="Helvetica" pitchFamily="2" charset="0"/>
+            </a:endParaRPr>
+          </a:p>
+        </p:txBody>
+      </p:sp>
+      <p:sp>
+        <p:nvSpPr>
+          <p:cNvPr id="61" name="TextBox 60"/>
+          <p:cNvSpPr txBox="1"/>
+          <p:nvPr/>
+        </p:nvSpPr>
+        <p:spPr>
+          <a:xfrm>
+            <a:off x="3087903" y="5220146"/>
+            <a:ext cx="3816424" cy="539700"/>
+          </a:xfrm>
+          <a:prstGeom prst="rect">
+            <a:avLst/>
+          </a:prstGeom>
+          <a:noFill/>
+          <a:ln>
+            <a:noFill/>
+          </a:ln>
+        </p:spPr>
+        <p:txBody>
+          <a:bodyPr wrap="square" lIns="0" tIns="0" rIns="0" bIns="46800" rtlCol="0">
+            <a:spAutoFit/>
+          </a:bodyPr>
+          <a:lstStyle/>
+          <a:p>
+            <a:pPr algn="ctr"/>
+            <a:r>
+              <a:rPr lang="en-US" sz="3200" b="1" spc="300" dirty="0">
+                <a:latin typeface="Helvetica" pitchFamily="2" charset="0"/>
+              </a:rPr>
+              <a:t>Development</a:t>
+            </a:r>
+          </a:p>
+        </p:txBody>
+      </p:sp>
+      <p:sp>
+        <p:nvSpPr>
+          <p:cNvPr id="62" name="TextBox 61"/>
+          <p:cNvSpPr txBox="1"/>
+          <p:nvPr/>
+        </p:nvSpPr>
+        <p:spPr>
+          <a:xfrm>
+            <a:off x="12652076" y="5220146"/>
+            <a:ext cx="4032448" cy="539700"/>
+          </a:xfrm>
+          <a:prstGeom prst="rect">
+            <a:avLst/>
+          </a:prstGeom>
+          <a:noFill/>
+          <a:ln>
+            <a:noFill/>
+          </a:ln>
+        </p:spPr>
+        <p:txBody>
+          <a:bodyPr wrap="square" lIns="0" tIns="0" rIns="0" bIns="46800" rtlCol="0">
+            <a:spAutoFit/>
+          </a:bodyPr>
+          <a:lstStyle/>
+          <a:p>
+            <a:pPr algn="ctr"/>
+            <a:r>
+              <a:rPr lang="en-US" sz="3200" b="1" spc="300">
+                <a:solidFill>
+                  <a:schemeClr val="bg2"/>
+                </a:solidFill>
+                <a:latin typeface="Helvetica" pitchFamily="2" charset="0"/>
+              </a:rPr>
+              <a:t>Progression</a:t>
+            </a:r>
+          </a:p>
+        </p:txBody>
+      </p:sp>
+      <p:sp>
+        <p:nvSpPr>
+          <p:cNvPr id="168" name="Arc 167">
+            <a:extLst>
+              <a:ext uri="{FF2B5EF4-FFF2-40B4-BE49-F238E27FC236}">
+                <a16:creationId xmlns:a16="http://schemas.microsoft.com/office/drawing/2014/main" id="{AAFF90BF-409A-BD4C-A216-CDAB46B1C6E7}"/>
+              </a:ext>
+            </a:extLst>
+          </p:cNvPr>
           <p:cNvSpPr/>
           <p:nvPr/>
         </p:nvSpPr>
         <p:spPr>
-          <a:xfrm rot="6289113">
-            <a:off x="10539354" y="3433970"/>
-            <a:ext cx="576064" cy="3628139"/>
-          </a:xfrm>
-          <a:prstGeom prst="upArrow">
+          <a:xfrm rot="18011414">
+            <a:off x="14246175" y="-1223734"/>
+            <a:ext cx="2445514" cy="6288254"/>
+          </a:xfrm>
+          <a:prstGeom prst="arc">
+            <a:avLst>
+              <a:gd name="adj1" fmla="val 20994791"/>
+              <a:gd name="adj2" fmla="val 4775161"/>
+            </a:avLst>
+          </a:prstGeom>
+          <a:ln w="63500">
+            <a:solidFill>
+              <a:schemeClr val="tx1">
+                <a:lumMod val="75000"/>
+                <a:lumOff val="25000"/>
+              </a:schemeClr>
+            </a:solidFill>
+            <a:tailEnd type="triangle" w="lg" len="lg"/>
+          </a:ln>
+          <a:effectLst/>
+        </p:spPr>
+        <p:style>
+          <a:lnRef idx="2">
+            <a:schemeClr val="accent1"/>
+          </a:lnRef>
+          <a:fillRef idx="0">
+            <a:schemeClr val="accent1"/>
+          </a:fillRef>
+          <a:effectRef idx="1">
+            <a:schemeClr val="accent1"/>
+          </a:effectRef>
+          <a:fontRef idx="minor">
+            <a:schemeClr val="tx1"/>
+          </a:fontRef>
+        </p:style>
+        <p:txBody>
+          <a:bodyPr rtlCol="0" anchor="ctr"/>
+          <a:lstStyle/>
+          <a:p>
+            <a:pPr algn="ctr"/>
+            <a:endParaRPr lang="en-US"/>
+          </a:p>
+        </p:txBody>
+      </p:sp>
+      <p:sp>
+        <p:nvSpPr>
+          <p:cNvPr id="126" name="Oval 125"/>
+          <p:cNvSpPr/>
+          <p:nvPr/>
+        </p:nvSpPr>
+        <p:spPr>
+          <a:xfrm>
+            <a:off x="13335767" y="625047"/>
+            <a:ext cx="432000" cy="432000"/>
+          </a:xfrm>
+          <a:prstGeom prst="ellipse">
             <a:avLst/>
           </a:prstGeom>
-          <a:gradFill>
-            <a:gsLst>
-              <a:gs pos="72000">
-                <a:schemeClr val="bg2">
-                  <a:lumMod val="50000"/>
-                </a:schemeClr>
-              </a:gs>
-              <a:gs pos="0">
-                <a:schemeClr val="bg1"/>
-              </a:gs>
-              <a:gs pos="37000">
-                <a:schemeClr val="bg1">
-                  <a:lumMod val="75000"/>
-                </a:schemeClr>
-              </a:gs>
-            </a:gsLst>
-          </a:gradFill>
-          <a:ln w="3175">
-            <a:noFill/>
+          <a:solidFill>
+            <a:schemeClr val="tx1">
+              <a:lumMod val="50000"/>
+              <a:lumOff val="50000"/>
+            </a:schemeClr>
+          </a:solidFill>
+          <a:ln>
+            <a:solidFill>
+              <a:schemeClr val="tx1"/>
+            </a:solidFill>
           </a:ln>
-          <a:effectLst/>
+          <a:effectLst>
+            <a:glow rad="596900">
+              <a:schemeClr val="bg1">
+                <a:alpha val="49000"/>
+              </a:schemeClr>
+            </a:glow>
+          </a:effectLst>
         </p:spPr>
         <p:style>
           <a:lnRef idx="1">
@@ -3698,51 +4705,108 @@
           </a:fontRef>
         </p:style>
         <p:txBody>
-          <a:bodyPr rtlCol="0" anchor="ctr"/>
+          <a:bodyPr lIns="108000" tIns="72000" bIns="72000" rtlCol="0" anchor="ctr" anchorCtr="1"/>
           <a:lstStyle/>
           <a:p>
             <a:pPr algn="ctr"/>
-            <a:endParaRPr lang="en-GB" dirty="0"/>
-          </a:p>
-        </p:txBody>
-      </p:sp>
-      <p:sp>
-        <p:nvSpPr>
-          <p:cNvPr id="34" name="Oval 33"/>
+            <a:r>
+              <a:rPr lang="en-US" sz="2400" dirty="0">
+                <a:latin typeface="Helvetica" pitchFamily="2" charset="0"/>
+              </a:rPr>
+              <a:t>5</a:t>
+            </a:r>
+          </a:p>
+        </p:txBody>
+      </p:sp>
+      <p:sp>
+        <p:nvSpPr>
+          <p:cNvPr id="176" name="Arc 175">
+            <a:extLst>
+              <a:ext uri="{FF2B5EF4-FFF2-40B4-BE49-F238E27FC236}">
+                <a16:creationId xmlns:a16="http://schemas.microsoft.com/office/drawing/2014/main" id="{4D2B39E5-3161-0244-A8BE-D51B0B9B315C}"/>
+              </a:ext>
+            </a:extLst>
+          </p:cNvPr>
           <p:cNvSpPr/>
           <p:nvPr/>
         </p:nvSpPr>
         <p:spPr>
+          <a:xfrm rot="15586816">
+            <a:off x="6372875" y="-1888562"/>
+            <a:ext cx="1193411" cy="7903182"/>
+          </a:xfrm>
+          <a:prstGeom prst="arc">
+            <a:avLst>
+              <a:gd name="adj1" fmla="val 16462917"/>
+              <a:gd name="adj2" fmla="val 5304196"/>
+            </a:avLst>
+          </a:prstGeom>
+          <a:ln w="63500">
+            <a:solidFill>
+              <a:schemeClr val="tx1">
+                <a:lumMod val="75000"/>
+                <a:lumOff val="25000"/>
+              </a:schemeClr>
+            </a:solidFill>
+            <a:tailEnd type="triangle" w="lg" len="lg"/>
+          </a:ln>
+          <a:effectLst/>
+        </p:spPr>
+        <p:style>
+          <a:lnRef idx="2">
+            <a:schemeClr val="accent1"/>
+          </a:lnRef>
+          <a:fillRef idx="0">
+            <a:schemeClr val="accent1"/>
+          </a:fillRef>
+          <a:effectRef idx="1">
+            <a:schemeClr val="accent1"/>
+          </a:effectRef>
+          <a:fontRef idx="minor">
+            <a:schemeClr val="tx1"/>
+          </a:fontRef>
+        </p:style>
+        <p:txBody>
+          <a:bodyPr rtlCol="0" anchor="ctr"/>
+          <a:lstStyle/>
+          <a:p>
+            <a:pPr algn="ctr"/>
+            <a:endParaRPr lang="en-US"/>
+          </a:p>
+        </p:txBody>
+      </p:sp>
+      <p:sp>
+        <p:nvSpPr>
+          <p:cNvPr id="125" name="Oval 124"/>
+          <p:cNvSpPr/>
+          <p:nvPr/>
+        </p:nvSpPr>
+        <p:spPr>
           <a:xfrm>
-            <a:off x="11088216" y="2750096"/>
-            <a:ext cx="3672408" cy="1800200"/>
+            <a:off x="5102596" y="3145886"/>
+            <a:ext cx="432000" cy="432000"/>
           </a:xfrm>
           <a:prstGeom prst="ellipse">
             <a:avLst/>
           </a:prstGeom>
-          <a:gradFill flip="none" rotWithShape="1">
-            <a:gsLst>
-              <a:gs pos="58000">
-                <a:schemeClr val="bg2">
-                  <a:lumMod val="75000"/>
-                </a:schemeClr>
-              </a:gs>
-              <a:gs pos="26000">
-                <a:schemeClr val="accent2">
-                  <a:lumMod val="60000"/>
-                  <a:lumOff val="40000"/>
-                </a:schemeClr>
-              </a:gs>
-            </a:gsLst>
-            <a:path path="shape">
-              <a:fillToRect l="50000" t="50000" r="50000" b="50000"/>
-            </a:path>
-            <a:tileRect/>
-          </a:gradFill>
+          <a:solidFill>
+            <a:schemeClr val="tx1">
+              <a:lumMod val="50000"/>
+              <a:lumOff val="50000"/>
+            </a:schemeClr>
+          </a:solidFill>
           <a:ln>
-            <a:noFill/>
+            <a:solidFill>
+              <a:schemeClr val="tx1"/>
+            </a:solidFill>
           </a:ln>
-          <a:effectLst/>
+          <a:effectLst>
+            <a:glow rad="596900">
+              <a:schemeClr val="bg1">
+                <a:alpha val="49000"/>
+              </a:schemeClr>
+            </a:glow>
+          </a:effectLst>
         </p:spPr>
         <p:style>
           <a:lnRef idx="1">
@@ -3759,52 +4823,108 @@
           </a:fontRef>
         </p:style>
         <p:txBody>
-          <a:bodyPr rtlCol="0" anchor="ctr"/>
+          <a:bodyPr lIns="108000" tIns="72000" bIns="72000" rtlCol="0" anchor="ctr" anchorCtr="1"/>
           <a:lstStyle/>
           <a:p>
             <a:pPr algn="ctr"/>
-            <a:endParaRPr lang="en-GB"/>
-          </a:p>
-        </p:txBody>
-      </p:sp>
-      <p:sp>
-        <p:nvSpPr>
-          <p:cNvPr id="35" name="Up Arrow 34"/>
+            <a:r>
+              <a:rPr lang="en-US" sz="2400" dirty="0">
+                <a:latin typeface="Helvetica" pitchFamily="2" charset="0"/>
+              </a:rPr>
+              <a:t>2</a:t>
+            </a:r>
+          </a:p>
+        </p:txBody>
+      </p:sp>
+      <p:sp>
+        <p:nvSpPr>
+          <p:cNvPr id="179" name="Arc 178">
+            <a:extLst>
+              <a:ext uri="{FF2B5EF4-FFF2-40B4-BE49-F238E27FC236}">
+                <a16:creationId xmlns:a16="http://schemas.microsoft.com/office/drawing/2014/main" id="{0D7F74DE-BE90-2C4E-BFB3-003DDC372C24}"/>
+              </a:ext>
+            </a:extLst>
+          </p:cNvPr>
           <p:cNvSpPr/>
           <p:nvPr/>
         </p:nvSpPr>
         <p:spPr>
-          <a:xfrm rot="4080090">
-            <a:off x="9847531" y="2709057"/>
-            <a:ext cx="576064" cy="3148715"/>
-          </a:xfrm>
-          <a:prstGeom prst="upArrow">
+          <a:xfrm rot="14283039" flipH="1">
+            <a:off x="7575300" y="-441997"/>
+            <a:ext cx="2215885" cy="4868981"/>
+          </a:xfrm>
+          <a:prstGeom prst="arc">
             <a:avLst>
-              <a:gd name="adj1" fmla="val 55895"/>
-              <a:gd name="adj2" fmla="val 50000"/>
+              <a:gd name="adj1" fmla="val 17314099"/>
+              <a:gd name="adj2" fmla="val 4545015"/>
             </a:avLst>
           </a:prstGeom>
-          <a:gradFill>
-            <a:gsLst>
-              <a:gs pos="45000">
-                <a:schemeClr val="bg1">
-                  <a:lumMod val="75000"/>
-                </a:schemeClr>
-              </a:gs>
-              <a:gs pos="23000">
-                <a:schemeClr val="bg1"/>
-              </a:gs>
-              <a:gs pos="95000">
-                <a:schemeClr val="bg2">
-                  <a:lumMod val="50000"/>
-                </a:schemeClr>
-              </a:gs>
-            </a:gsLst>
-          </a:gradFill>
-          <a:ln w="3175">
-            <a:noFill/>
+          <a:ln w="63500">
+            <a:solidFill>
+              <a:schemeClr val="tx1">
+                <a:lumMod val="75000"/>
+                <a:lumOff val="25000"/>
+              </a:schemeClr>
+            </a:solidFill>
+            <a:tailEnd type="triangle" w="lg" len="lg"/>
           </a:ln>
           <a:effectLst/>
+        </p:spPr>
+        <p:style>
+          <a:lnRef idx="2">
+            <a:schemeClr val="accent1"/>
+          </a:lnRef>
+          <a:fillRef idx="0">
+            <a:schemeClr val="accent1"/>
+          </a:fillRef>
+          <a:effectRef idx="1">
+            <a:schemeClr val="accent1"/>
+          </a:effectRef>
+          <a:fontRef idx="minor">
+            <a:schemeClr val="tx1"/>
+          </a:fontRef>
+        </p:style>
+        <p:txBody>
+          <a:bodyPr rtlCol="0" anchor="ctr"/>
+          <a:lstStyle/>
+          <a:p>
+            <a:pPr algn="ctr"/>
+            <a:endParaRPr lang="en-US"/>
+          </a:p>
+        </p:txBody>
+      </p:sp>
+      <p:sp>
+        <p:nvSpPr>
+          <p:cNvPr id="134" name="Oval 133"/>
+          <p:cNvSpPr/>
+          <p:nvPr/>
+        </p:nvSpPr>
+        <p:spPr>
+          <a:xfrm>
+            <a:off x="13304092" y="2044349"/>
+            <a:ext cx="432000" cy="432000"/>
+          </a:xfrm>
+          <a:prstGeom prst="ellipse">
+            <a:avLst/>
+          </a:prstGeom>
+          <a:solidFill>
+            <a:schemeClr val="tx1">
+              <a:lumMod val="50000"/>
+              <a:lumOff val="50000"/>
+            </a:schemeClr>
+          </a:solidFill>
+          <a:ln>
+            <a:solidFill>
+              <a:schemeClr val="tx1"/>
+            </a:solidFill>
+          </a:ln>
+          <a:effectLst>
+            <a:glow rad="596900">
+              <a:schemeClr val="bg1">
+                <a:alpha val="49000"/>
+              </a:schemeClr>
+            </a:glow>
+          </a:effectLst>
         </p:spPr>
         <p:style>
           <a:lnRef idx="1">
@@ -3821,47 +4941,345 @@
           </a:fontRef>
         </p:style>
         <p:txBody>
-          <a:bodyPr rtlCol="0" anchor="ctr"/>
+          <a:bodyPr lIns="108000" tIns="72000" bIns="72000" rtlCol="0" anchor="ctr" anchorCtr="1"/>
           <a:lstStyle/>
           <a:p>
             <a:pPr algn="ctr"/>
-            <a:endParaRPr lang="en-GB"/>
-          </a:p>
-        </p:txBody>
-      </p:sp>
-      <p:sp>
-        <p:nvSpPr>
-          <p:cNvPr id="50" name="Oval 49"/>
+            <a:r>
+              <a:rPr lang="en-US" sz="2400" dirty="0">
+                <a:latin typeface="Helvetica" pitchFamily="2" charset="0"/>
+              </a:rPr>
+              <a:t>4</a:t>
+            </a:r>
+          </a:p>
+        </p:txBody>
+      </p:sp>
+      <p:sp>
+        <p:nvSpPr>
+          <p:cNvPr id="2" name="TextBox 1">
+            <a:extLst>
+              <a:ext uri="{FF2B5EF4-FFF2-40B4-BE49-F238E27FC236}">
+                <a16:creationId xmlns:a16="http://schemas.microsoft.com/office/drawing/2014/main" id="{45F6E278-7332-8549-98F4-DA3B446DED55}"/>
+              </a:ext>
+            </a:extLst>
+          </p:cNvPr>
+          <p:cNvSpPr txBox="1"/>
+          <p:nvPr/>
+        </p:nvSpPr>
+        <p:spPr>
+          <a:xfrm>
+            <a:off x="1472868" y="687842"/>
+            <a:ext cx="2192678" cy="400110"/>
+          </a:xfrm>
+          <a:prstGeom prst="rect">
+            <a:avLst/>
+          </a:prstGeom>
+          <a:noFill/>
+        </p:spPr>
+        <p:txBody>
+          <a:bodyPr wrap="square" rtlCol="0">
+            <a:spAutoFit/>
+          </a:bodyPr>
+          <a:lstStyle/>
+          <a:p>
+            <a:pPr algn="ctr"/>
+            <a:r>
+              <a:rPr lang="en-US" sz="2000" dirty="0">
+                <a:solidFill>
+                  <a:schemeClr val="bg1"/>
+                </a:solidFill>
+                <a:latin typeface="Helvetica" pitchFamily="2" charset="0"/>
+              </a:rPr>
+              <a:t>Bladder</a:t>
+            </a:r>
+          </a:p>
+        </p:txBody>
+      </p:sp>
+      <p:sp>
+        <p:nvSpPr>
+          <p:cNvPr id="101" name="TextBox 100">
+            <a:extLst>
+              <a:ext uri="{FF2B5EF4-FFF2-40B4-BE49-F238E27FC236}">
+                <a16:creationId xmlns:a16="http://schemas.microsoft.com/office/drawing/2014/main" id="{FF0DF1BE-2188-DC41-836C-D80F9306685A}"/>
+              </a:ext>
+            </a:extLst>
+          </p:cNvPr>
+          <p:cNvSpPr txBox="1"/>
+          <p:nvPr/>
+        </p:nvSpPr>
+        <p:spPr>
+          <a:xfrm>
+            <a:off x="1037025" y="4259427"/>
+            <a:ext cx="2837343" cy="400110"/>
+          </a:xfrm>
+          <a:prstGeom prst="rect">
+            <a:avLst/>
+          </a:prstGeom>
+          <a:noFill/>
+        </p:spPr>
+        <p:txBody>
+          <a:bodyPr wrap="square" rtlCol="0">
+            <a:spAutoFit/>
+          </a:bodyPr>
+          <a:lstStyle/>
+          <a:p>
+            <a:pPr algn="ctr"/>
+            <a:r>
+              <a:rPr lang="en-US" sz="2000" dirty="0">
+                <a:latin typeface="Helvetica" pitchFamily="2" charset="0"/>
+              </a:rPr>
+              <a:t>Urethra</a:t>
+            </a:r>
+          </a:p>
+        </p:txBody>
+      </p:sp>
+      <p:sp>
+        <p:nvSpPr>
+          <p:cNvPr id="107" name="TextBox 106">
+            <a:extLst>
+              <a:ext uri="{FF2B5EF4-FFF2-40B4-BE49-F238E27FC236}">
+                <a16:creationId xmlns:a16="http://schemas.microsoft.com/office/drawing/2014/main" id="{4FE830D2-D8A6-D044-839E-83F203700DA2}"/>
+              </a:ext>
+            </a:extLst>
+          </p:cNvPr>
+          <p:cNvSpPr txBox="1"/>
+          <p:nvPr/>
+        </p:nvSpPr>
+        <p:spPr>
+          <a:xfrm>
+            <a:off x="2875145" y="3854249"/>
+            <a:ext cx="2837343" cy="400110"/>
+          </a:xfrm>
+          <a:prstGeom prst="rect">
+            <a:avLst/>
+          </a:prstGeom>
+          <a:noFill/>
+        </p:spPr>
+        <p:txBody>
+          <a:bodyPr wrap="square" rtlCol="0">
+            <a:spAutoFit/>
+          </a:bodyPr>
+          <a:lstStyle/>
+          <a:p>
+            <a:pPr algn="ctr"/>
+            <a:r>
+              <a:rPr lang="en-US" sz="2000" dirty="0">
+                <a:latin typeface="Helvetica" pitchFamily="2" charset="0"/>
+              </a:rPr>
+              <a:t>Lymph nodes</a:t>
+            </a:r>
+          </a:p>
+        </p:txBody>
+      </p:sp>
+      <p:sp>
+        <p:nvSpPr>
+          <p:cNvPr id="140" name="TextBox 139">
+            <a:extLst>
+              <a:ext uri="{FF2B5EF4-FFF2-40B4-BE49-F238E27FC236}">
+                <a16:creationId xmlns:a16="http://schemas.microsoft.com/office/drawing/2014/main" id="{7FBB00ED-6B05-E443-934B-223B2B73C573}"/>
+              </a:ext>
+            </a:extLst>
+          </p:cNvPr>
+          <p:cNvSpPr txBox="1"/>
+          <p:nvPr/>
+        </p:nvSpPr>
+        <p:spPr>
+          <a:xfrm>
+            <a:off x="200446" y="3749256"/>
+            <a:ext cx="1688204" cy="707886"/>
+          </a:xfrm>
+          <a:prstGeom prst="rect">
+            <a:avLst/>
+          </a:prstGeom>
+          <a:noFill/>
+        </p:spPr>
+        <p:txBody>
+          <a:bodyPr wrap="square" rtlCol="0">
+            <a:spAutoFit/>
+          </a:bodyPr>
+          <a:lstStyle/>
+          <a:p>
+            <a:pPr algn="ctr"/>
+            <a:r>
+              <a:rPr lang="en-US" sz="2000" dirty="0">
+                <a:latin typeface="Helvetica" pitchFamily="2" charset="0"/>
+              </a:rPr>
+              <a:t>Seminal vesicle</a:t>
+            </a:r>
+          </a:p>
+        </p:txBody>
+      </p:sp>
+      <p:cxnSp>
+        <p:nvCxnSpPr>
+          <p:cNvPr id="5" name="Straight Connector 4">
+            <a:extLst>
+              <a:ext uri="{FF2B5EF4-FFF2-40B4-BE49-F238E27FC236}">
+                <a16:creationId xmlns:a16="http://schemas.microsoft.com/office/drawing/2014/main" id="{EF885950-A1FC-7F4F-AED0-2B716D4F1AA2}"/>
+              </a:ext>
+            </a:extLst>
+          </p:cNvPr>
+          <p:cNvCxnSpPr>
+            <a:cxnSpLocks/>
+          </p:cNvCxnSpPr>
+          <p:nvPr/>
+        </p:nvCxnSpPr>
+        <p:spPr>
+          <a:xfrm flipV="1">
+            <a:off x="1132778" y="3355074"/>
+            <a:ext cx="0" cy="430026"/>
+          </a:xfrm>
+          <a:prstGeom prst="line">
+            <a:avLst/>
+          </a:prstGeom>
+          <a:ln w="25400">
+            <a:solidFill>
+              <a:schemeClr val="tx1"/>
+            </a:solidFill>
+            <a:headEnd type="none"/>
+            <a:tailEnd type="oval"/>
+          </a:ln>
+          <a:effectLst/>
+        </p:spPr>
+        <p:style>
+          <a:lnRef idx="2">
+            <a:schemeClr val="accent1"/>
+          </a:lnRef>
+          <a:fillRef idx="0">
+            <a:schemeClr val="accent1"/>
+          </a:fillRef>
+          <a:effectRef idx="1">
+            <a:schemeClr val="accent1"/>
+          </a:effectRef>
+          <a:fontRef idx="minor">
+            <a:schemeClr val="tx1"/>
+          </a:fontRef>
+        </p:style>
+      </p:cxnSp>
+      <p:cxnSp>
+        <p:nvCxnSpPr>
+          <p:cNvPr id="144" name="Straight Connector 143">
+            <a:extLst>
+              <a:ext uri="{FF2B5EF4-FFF2-40B4-BE49-F238E27FC236}">
+                <a16:creationId xmlns:a16="http://schemas.microsoft.com/office/drawing/2014/main" id="{A31D69DE-672A-DD4A-A637-7B71E4451761}"/>
+              </a:ext>
+            </a:extLst>
+          </p:cNvPr>
+          <p:cNvCxnSpPr>
+            <a:cxnSpLocks/>
+          </p:cNvCxnSpPr>
+          <p:nvPr/>
+        </p:nvCxnSpPr>
+        <p:spPr>
+          <a:xfrm flipV="1">
+            <a:off x="4219175" y="3621417"/>
+            <a:ext cx="0" cy="284388"/>
+          </a:xfrm>
+          <a:prstGeom prst="line">
+            <a:avLst/>
+          </a:prstGeom>
+          <a:ln w="25400">
+            <a:solidFill>
+              <a:schemeClr val="tx1"/>
+            </a:solidFill>
+            <a:headEnd type="none"/>
+            <a:tailEnd type="oval"/>
+          </a:ln>
+          <a:effectLst/>
+        </p:spPr>
+        <p:style>
+          <a:lnRef idx="2">
+            <a:schemeClr val="accent1"/>
+          </a:lnRef>
+          <a:fillRef idx="0">
+            <a:schemeClr val="accent1"/>
+          </a:fillRef>
+          <a:effectRef idx="1">
+            <a:schemeClr val="accent1"/>
+          </a:effectRef>
+          <a:fontRef idx="minor">
+            <a:schemeClr val="tx1"/>
+          </a:fontRef>
+        </p:style>
+      </p:cxnSp>
+      <p:cxnSp>
+        <p:nvCxnSpPr>
+          <p:cNvPr id="145" name="Straight Connector 144">
+            <a:extLst>
+              <a:ext uri="{FF2B5EF4-FFF2-40B4-BE49-F238E27FC236}">
+                <a16:creationId xmlns:a16="http://schemas.microsoft.com/office/drawing/2014/main" id="{77910412-B71E-C14F-AA16-D1CEDB5D5429}"/>
+              </a:ext>
+            </a:extLst>
+          </p:cNvPr>
+          <p:cNvCxnSpPr>
+            <a:cxnSpLocks/>
+          </p:cNvCxnSpPr>
+          <p:nvPr/>
+        </p:nvCxnSpPr>
+        <p:spPr>
+          <a:xfrm flipV="1">
+            <a:off x="2509432" y="3969971"/>
+            <a:ext cx="0" cy="284388"/>
+          </a:xfrm>
+          <a:prstGeom prst="line">
+            <a:avLst/>
+          </a:prstGeom>
+          <a:ln w="25400">
+            <a:solidFill>
+              <a:schemeClr val="tx1"/>
+            </a:solidFill>
+            <a:headEnd type="none"/>
+            <a:tailEnd type="oval"/>
+          </a:ln>
+          <a:effectLst/>
+        </p:spPr>
+        <p:style>
+          <a:lnRef idx="2">
+            <a:schemeClr val="accent1"/>
+          </a:lnRef>
+          <a:fillRef idx="0">
+            <a:schemeClr val="accent1"/>
+          </a:fillRef>
+          <a:effectRef idx="1">
+            <a:schemeClr val="accent1"/>
+          </a:effectRef>
+          <a:fontRef idx="minor">
+            <a:schemeClr val="tx1"/>
+          </a:fontRef>
+        </p:style>
+      </p:cxnSp>
+      <p:sp>
+        <p:nvSpPr>
+          <p:cNvPr id="147" name="Oval 146">
+            <a:extLst>
+              <a:ext uri="{FF2B5EF4-FFF2-40B4-BE49-F238E27FC236}">
+                <a16:creationId xmlns:a16="http://schemas.microsoft.com/office/drawing/2014/main" id="{F0A7D1D4-BECB-8A43-AF96-941ADDB0A62E}"/>
+              </a:ext>
+            </a:extLst>
+          </p:cNvPr>
           <p:cNvSpPr/>
           <p:nvPr/>
         </p:nvSpPr>
         <p:spPr>
           <a:xfrm>
-            <a:off x="4615072" y="3254152"/>
-            <a:ext cx="4600936" cy="3059832"/>
+            <a:off x="11535840" y="1261470"/>
+            <a:ext cx="108000" cy="108000"/>
           </a:xfrm>
           <a:prstGeom prst="ellipse">
             <a:avLst/>
           </a:prstGeom>
-          <a:gradFill flip="none" rotWithShape="1">
-            <a:gsLst>
-              <a:gs pos="38000">
-                <a:schemeClr val="accent2">
-                  <a:lumMod val="60000"/>
-                  <a:lumOff val="40000"/>
-                </a:schemeClr>
-              </a:gs>
-              <a:gs pos="100000">
-                <a:srgbClr val="FFFFFF"/>
-              </a:gs>
-            </a:gsLst>
-            <a:path path="shape">
-              <a:fillToRect l="50000" t="50000" r="50000" b="50000"/>
-            </a:path>
-            <a:tileRect/>
-          </a:gradFill>
-          <a:ln>
-            <a:noFill/>
+          <a:solidFill>
+            <a:schemeClr val="tx1">
+              <a:lumMod val="75000"/>
+              <a:lumOff val="25000"/>
+            </a:schemeClr>
+          </a:solidFill>
+          <a:ln w="63500">
+            <a:solidFill>
+              <a:schemeClr val="tx1">
+                <a:lumMod val="75000"/>
+                <a:lumOff val="25000"/>
+              </a:schemeClr>
+            </a:solidFill>
           </a:ln>
           <a:effectLst/>
         </p:spPr>
@@ -3884,43 +5302,42 @@
           <a:lstStyle/>
           <a:p>
             <a:pPr algn="ctr"/>
-            <a:endParaRPr lang="en-GB"/>
-          </a:p>
-        </p:txBody>
-      </p:sp>
-      <p:sp>
-        <p:nvSpPr>
-          <p:cNvPr id="52" name="Up Arrow 51"/>
+            <a:endParaRPr lang="en-US"/>
+          </a:p>
+        </p:txBody>
+      </p:sp>
+      <p:sp>
+        <p:nvSpPr>
+          <p:cNvPr id="124" name="Oval 123"/>
           <p:cNvSpPr/>
           <p:nvPr/>
         </p:nvSpPr>
         <p:spPr>
-          <a:xfrm rot="4115190">
-            <a:off x="4259130" y="4108416"/>
-            <a:ext cx="576064" cy="2711836"/>
-          </a:xfrm>
-          <a:prstGeom prst="upArrow">
+          <a:xfrm>
+            <a:off x="6857441" y="1227343"/>
+            <a:ext cx="432000" cy="432000"/>
+          </a:xfrm>
+          <a:prstGeom prst="ellipse">
             <a:avLst/>
           </a:prstGeom>
-          <a:gradFill>
-            <a:gsLst>
-              <a:gs pos="64000">
-                <a:schemeClr val="bg1">
-                  <a:lumMod val="75000"/>
-                </a:schemeClr>
-              </a:gs>
-              <a:gs pos="35000">
-                <a:schemeClr val="bg1"/>
-              </a:gs>
-              <a:gs pos="99000">
-                <a:srgbClr val="C24845"/>
-              </a:gs>
-            </a:gsLst>
-          </a:gradFill>
-          <a:ln w="3175">
-            <a:noFill/>
+          <a:solidFill>
+            <a:schemeClr val="tx1">
+              <a:lumMod val="50000"/>
+              <a:lumOff val="50000"/>
+            </a:schemeClr>
+          </a:solidFill>
+          <a:ln>
+            <a:solidFill>
+              <a:schemeClr val="tx1"/>
+            </a:solidFill>
           </a:ln>
-          <a:effectLst/>
+          <a:effectLst>
+            <a:glow rad="596900">
+              <a:schemeClr val="bg1">
+                <a:alpha val="49000"/>
+              </a:schemeClr>
+            </a:glow>
+          </a:effectLst>
         </p:spPr>
         <p:style>
           <a:lnRef idx="1">
@@ -3937,49 +5354,51 @@
           </a:fontRef>
         </p:style>
         <p:txBody>
-          <a:bodyPr rtlCol="0" anchor="ctr"/>
+          <a:bodyPr lIns="108000" tIns="72000" bIns="72000" rtlCol="0" anchor="ctr" anchorCtr="1"/>
           <a:lstStyle/>
           <a:p>
             <a:pPr algn="ctr"/>
-            <a:endParaRPr lang="en-GB"/>
-          </a:p>
-        </p:txBody>
-      </p:sp>
-      <p:sp>
-        <p:nvSpPr>
-          <p:cNvPr id="53" name="Oval 52"/>
+            <a:r>
+              <a:rPr lang="en-US" sz="2400" dirty="0">
+                <a:latin typeface="Helvetica" pitchFamily="2" charset="0"/>
+              </a:rPr>
+              <a:t>1</a:t>
+            </a:r>
+          </a:p>
+        </p:txBody>
+      </p:sp>
+      <p:sp>
+        <p:nvSpPr>
+          <p:cNvPr id="128" name="Oval 127"/>
           <p:cNvSpPr/>
           <p:nvPr/>
         </p:nvSpPr>
         <p:spPr>
           <a:xfrm>
-            <a:off x="1114600" y="5234880"/>
-            <a:ext cx="2880320" cy="1368152"/>
+            <a:off x="9033861" y="2713886"/>
+            <a:ext cx="432000" cy="432000"/>
           </a:xfrm>
           <a:prstGeom prst="ellipse">
             <a:avLst/>
           </a:prstGeom>
-          <a:gradFill flip="none" rotWithShape="1">
-            <a:gsLst>
-              <a:gs pos="31000">
-                <a:schemeClr val="accent6">
-                  <a:lumMod val="60000"/>
-                  <a:lumOff val="40000"/>
-                </a:schemeClr>
-              </a:gs>
-              <a:gs pos="100000">
-                <a:srgbClr val="FFFFFF"/>
-              </a:gs>
-            </a:gsLst>
-            <a:path path="shape">
-              <a:fillToRect l="50000" t="50000" r="50000" b="50000"/>
-            </a:path>
-            <a:tileRect/>
-          </a:gradFill>
+          <a:solidFill>
+            <a:schemeClr val="tx1">
+              <a:lumMod val="50000"/>
+              <a:lumOff val="50000"/>
+            </a:schemeClr>
+          </a:solidFill>
           <a:ln>
-            <a:noFill/>
+            <a:solidFill>
+              <a:schemeClr val="tx1"/>
+            </a:solidFill>
           </a:ln>
-          <a:effectLst/>
+          <a:effectLst>
+            <a:glow rad="596900">
+              <a:schemeClr val="bg1">
+                <a:alpha val="49000"/>
+              </a:schemeClr>
+            </a:glow>
+          </a:effectLst>
         </p:spPr>
         <p:style>
           <a:lnRef idx="1">
@@ -3996,745 +5415,16 @@
           </a:fontRef>
         </p:style>
         <p:txBody>
-          <a:bodyPr rtlCol="0" anchor="ctr"/>
+          <a:bodyPr lIns="108000" tIns="72000" bIns="72000" rtlCol="0" anchor="ctr" anchorCtr="1"/>
           <a:lstStyle/>
           <a:p>
             <a:pPr algn="ctr"/>
-            <a:endParaRPr lang="en-GB"/>
-          </a:p>
-        </p:txBody>
-      </p:sp>
-      <p:sp>
-        <p:nvSpPr>
-          <p:cNvPr id="54" name="Up Arrow 53"/>
-          <p:cNvSpPr/>
-          <p:nvPr/>
-        </p:nvSpPr>
-        <p:spPr>
-          <a:xfrm rot="20772860" flipV="1">
-            <a:off x="1794906" y="3318095"/>
-            <a:ext cx="576064" cy="2372182"/>
-          </a:xfrm>
-          <a:prstGeom prst="upArrow">
-            <a:avLst/>
-          </a:prstGeom>
-          <a:gradFill>
-            <a:gsLst>
-              <a:gs pos="70000">
-                <a:schemeClr val="bg1">
-                  <a:lumMod val="75000"/>
-                </a:schemeClr>
-              </a:gs>
-              <a:gs pos="30000">
-                <a:schemeClr val="bg1"/>
-              </a:gs>
-              <a:gs pos="100000">
-                <a:srgbClr val="FFA61B"/>
-              </a:gs>
-            </a:gsLst>
-          </a:gradFill>
-          <a:ln w="3175">
-            <a:noFill/>
-          </a:ln>
-          <a:effectLst/>
-        </p:spPr>
-        <p:style>
-          <a:lnRef idx="1">
-            <a:schemeClr val="accent1"/>
-          </a:lnRef>
-          <a:fillRef idx="3">
-            <a:schemeClr val="accent1"/>
-          </a:fillRef>
-          <a:effectRef idx="2">
-            <a:schemeClr val="accent1"/>
-          </a:effectRef>
-          <a:fontRef idx="minor">
-            <a:schemeClr val="lt1"/>
-          </a:fontRef>
-        </p:style>
-        <p:txBody>
-          <a:bodyPr rtlCol="0" anchor="ctr"/>
-          <a:lstStyle/>
-          <a:p>
-            <a:pPr algn="ctr"/>
-            <a:endParaRPr lang="en-GB"/>
-          </a:p>
-        </p:txBody>
-      </p:sp>
-      <p:sp>
-        <p:nvSpPr>
-          <p:cNvPr id="55" name="Up Arrow 54"/>
-          <p:cNvSpPr/>
-          <p:nvPr/>
-        </p:nvSpPr>
-        <p:spPr>
-          <a:xfrm rot="7427873">
-            <a:off x="4259074" y="2059245"/>
-            <a:ext cx="576064" cy="3033178"/>
-          </a:xfrm>
-          <a:prstGeom prst="upArrow">
-            <a:avLst/>
-          </a:prstGeom>
-          <a:gradFill>
-            <a:gsLst>
-              <a:gs pos="67000">
-                <a:schemeClr val="bg1">
-                  <a:lumMod val="75000"/>
-                </a:schemeClr>
-              </a:gs>
-              <a:gs pos="25000">
-                <a:schemeClr val="bg1"/>
-              </a:gs>
-              <a:gs pos="99000">
-                <a:srgbClr val="B2413F"/>
-              </a:gs>
-            </a:gsLst>
-          </a:gradFill>
-          <a:ln w="3175">
-            <a:noFill/>
-          </a:ln>
-          <a:effectLst/>
-        </p:spPr>
-        <p:style>
-          <a:lnRef idx="1">
-            <a:schemeClr val="accent1"/>
-          </a:lnRef>
-          <a:fillRef idx="3">
-            <a:schemeClr val="accent1"/>
-          </a:fillRef>
-          <a:effectRef idx="2">
-            <a:schemeClr val="accent1"/>
-          </a:effectRef>
-          <a:fontRef idx="minor">
-            <a:schemeClr val="lt1"/>
-          </a:fontRef>
-        </p:style>
-        <p:txBody>
-          <a:bodyPr rtlCol="0" anchor="ctr"/>
-          <a:lstStyle/>
-          <a:p>
-            <a:pPr algn="ctr"/>
-            <a:endParaRPr lang="en-GB"/>
-          </a:p>
-        </p:txBody>
-      </p:sp>
-      <p:sp>
-        <p:nvSpPr>
-          <p:cNvPr id="56" name="Oval 55"/>
-          <p:cNvSpPr/>
-          <p:nvPr/>
-        </p:nvSpPr>
-        <p:spPr>
-          <a:xfrm>
-            <a:off x="331427" y="1098527"/>
-            <a:ext cx="3490218" cy="2670944"/>
-          </a:xfrm>
-          <a:prstGeom prst="ellipse">
-            <a:avLst/>
-          </a:prstGeom>
-          <a:gradFill flip="none" rotWithShape="1">
-            <a:gsLst>
-              <a:gs pos="12000">
-                <a:schemeClr val="accent3">
-                  <a:lumMod val="75000"/>
-                </a:schemeClr>
-              </a:gs>
-              <a:gs pos="100000">
-                <a:srgbClr val="FFFFFF"/>
-              </a:gs>
-            </a:gsLst>
-            <a:path path="shape">
-              <a:fillToRect l="50000" t="50000" r="50000" b="50000"/>
-            </a:path>
-            <a:tileRect/>
-          </a:gradFill>
-          <a:ln>
-            <a:noFill/>
-          </a:ln>
-          <a:effectLst/>
-        </p:spPr>
-        <p:style>
-          <a:lnRef idx="1">
-            <a:schemeClr val="accent1"/>
-          </a:lnRef>
-          <a:fillRef idx="3">
-            <a:schemeClr val="accent1"/>
-          </a:fillRef>
-          <a:effectRef idx="2">
-            <a:schemeClr val="accent1"/>
-          </a:effectRef>
-          <a:fontRef idx="minor">
-            <a:schemeClr val="lt1"/>
-          </a:fontRef>
-        </p:style>
-        <p:txBody>
-          <a:bodyPr rtlCol="0" anchor="ctr"/>
-          <a:lstStyle/>
-          <a:p>
-            <a:pPr algn="ctr"/>
-            <a:endParaRPr lang="en-GB"/>
-          </a:p>
-        </p:txBody>
-      </p:sp>
-      <p:sp>
-        <p:nvSpPr>
-          <p:cNvPr id="57" name="TextBox 56"/>
-          <p:cNvSpPr txBox="1"/>
-          <p:nvPr/>
-        </p:nvSpPr>
-        <p:spPr>
-          <a:xfrm>
-            <a:off x="11808296" y="3326160"/>
-            <a:ext cx="2592288" cy="648000"/>
-          </a:xfrm>
-          <a:prstGeom prst="rect">
-            <a:avLst/>
-          </a:prstGeom>
-          <a:noFill/>
-          <a:ln>
-            <a:noFill/>
-          </a:ln>
-        </p:spPr>
-        <p:txBody>
-          <a:bodyPr wrap="square" tIns="0" rtlCol="0" anchor="ctr" anchorCtr="1">
-            <a:noAutofit/>
-          </a:bodyPr>
-          <a:lstStyle/>
-          <a:p>
-            <a:pPr algn="ctr"/>
-            <a:r>
-              <a:rPr lang="en-GB" sz="2800" b="1" dirty="0" smtClean="0"/>
-              <a:t>Metastatic primary tumour</a:t>
-            </a:r>
-            <a:endParaRPr lang="en-GB" sz="2800" b="1" dirty="0"/>
-          </a:p>
-        </p:txBody>
-      </p:sp>
-      <p:sp>
-        <p:nvSpPr>
-          <p:cNvPr id="60" name="TextBox 59"/>
-          <p:cNvSpPr txBox="1"/>
-          <p:nvPr/>
-        </p:nvSpPr>
-        <p:spPr>
-          <a:xfrm>
-            <a:off x="12456368" y="5486400"/>
-            <a:ext cx="2304256" cy="648000"/>
-          </a:xfrm>
-          <a:prstGeom prst="rect">
-            <a:avLst/>
-          </a:prstGeom>
-          <a:noFill/>
-          <a:ln>
-            <a:noFill/>
-          </a:ln>
-        </p:spPr>
-        <p:txBody>
-          <a:bodyPr wrap="square" tIns="0" rtlCol="0" anchor="ctr" anchorCtr="1">
-            <a:noAutofit/>
-          </a:bodyPr>
-          <a:lstStyle/>
-          <a:p>
-            <a:pPr algn="ctr"/>
-            <a:r>
-              <a:rPr lang="en-GB" sz="2800" b="1" dirty="0" smtClean="0"/>
-              <a:t>Metastasis</a:t>
-            </a:r>
-          </a:p>
-        </p:txBody>
-      </p:sp>
-      <p:sp>
-        <p:nvSpPr>
-          <p:cNvPr id="61" name="TextBox 60"/>
-          <p:cNvSpPr txBox="1"/>
-          <p:nvPr/>
-        </p:nvSpPr>
-        <p:spPr>
-          <a:xfrm>
-            <a:off x="5903640" y="4406280"/>
-            <a:ext cx="2592288" cy="648000"/>
-          </a:xfrm>
-          <a:prstGeom prst="rect">
-            <a:avLst/>
-          </a:prstGeom>
-          <a:noFill/>
-          <a:ln>
-            <a:noFill/>
-          </a:ln>
-        </p:spPr>
-        <p:txBody>
-          <a:bodyPr wrap="square" tIns="0" rtlCol="0" anchor="ctr" anchorCtr="1">
-            <a:noAutofit/>
-          </a:bodyPr>
-          <a:lstStyle/>
-          <a:p>
-            <a:pPr algn="ctr"/>
-            <a:r>
-              <a:rPr lang="en-GB" sz="2800" b="1" dirty="0" smtClean="0"/>
-              <a:t>Primary tumour</a:t>
-            </a:r>
-            <a:endParaRPr lang="en-GB" sz="2800" b="1" dirty="0"/>
-          </a:p>
-        </p:txBody>
-      </p:sp>
-      <p:sp>
-        <p:nvSpPr>
-          <p:cNvPr id="62" name="Right Arrow 61"/>
-          <p:cNvSpPr/>
-          <p:nvPr/>
-        </p:nvSpPr>
-        <p:spPr>
-          <a:xfrm>
-            <a:off x="215008" y="7142584"/>
-            <a:ext cx="15697744" cy="1115616"/>
-          </a:xfrm>
-          <a:prstGeom prst="rightArrow">
-            <a:avLst/>
-          </a:prstGeom>
-          <a:gradFill flip="none" rotWithShape="1">
-            <a:gsLst>
-              <a:gs pos="0">
-                <a:schemeClr val="bg1"/>
-              </a:gs>
-              <a:gs pos="80000">
-                <a:schemeClr val="tx1"/>
-              </a:gs>
-            </a:gsLst>
-            <a:lin ang="21300000" scaled="0"/>
-            <a:tileRect/>
-          </a:gradFill>
-          <a:ln>
-            <a:noFill/>
-          </a:ln>
-          <a:effectLst/>
-        </p:spPr>
-        <p:style>
-          <a:lnRef idx="1">
-            <a:schemeClr val="accent1"/>
-          </a:lnRef>
-          <a:fillRef idx="3">
-            <a:schemeClr val="accent1"/>
-          </a:fillRef>
-          <a:effectRef idx="2">
-            <a:schemeClr val="accent1"/>
-          </a:effectRef>
-          <a:fontRef idx="minor">
-            <a:schemeClr val="lt1"/>
-          </a:fontRef>
-        </p:style>
-        <p:txBody>
-          <a:bodyPr rtlCol="0" anchor="ctr"/>
-          <a:lstStyle/>
-          <a:p>
-            <a:pPr algn="ctr"/>
-            <a:endParaRPr lang="en-US"/>
-          </a:p>
-        </p:txBody>
-      </p:sp>
-      <p:sp>
-        <p:nvSpPr>
-          <p:cNvPr id="63" name="TextBox 62"/>
-          <p:cNvSpPr txBox="1"/>
-          <p:nvPr/>
-        </p:nvSpPr>
-        <p:spPr>
-          <a:xfrm>
-            <a:off x="1961456" y="7358608"/>
-            <a:ext cx="3816424" cy="601255"/>
-          </a:xfrm>
-          <a:prstGeom prst="rect">
-            <a:avLst/>
-          </a:prstGeom>
-          <a:noFill/>
-          <a:ln>
-            <a:noFill/>
-          </a:ln>
-        </p:spPr>
-        <p:txBody>
-          <a:bodyPr wrap="square" lIns="0" tIns="0" rIns="0" bIns="46800" rtlCol="0">
-            <a:spAutoFit/>
-          </a:bodyPr>
-          <a:lstStyle/>
-          <a:p>
-            <a:pPr algn="ctr"/>
-            <a:r>
-              <a:rPr lang="en-GB" sz="3600" b="1" spc="300" dirty="0" smtClean="0"/>
-              <a:t>Development</a:t>
-            </a:r>
-          </a:p>
-        </p:txBody>
-      </p:sp>
-      <p:sp>
-        <p:nvSpPr>
-          <p:cNvPr id="64" name="TextBox 63"/>
-          <p:cNvSpPr txBox="1"/>
-          <p:nvPr/>
-        </p:nvSpPr>
-        <p:spPr>
-          <a:xfrm>
-            <a:off x="9792072" y="7358608"/>
-            <a:ext cx="4032448" cy="601255"/>
-          </a:xfrm>
-          <a:prstGeom prst="rect">
-            <a:avLst/>
-          </a:prstGeom>
-          <a:noFill/>
-          <a:ln>
-            <a:noFill/>
-          </a:ln>
-        </p:spPr>
-        <p:txBody>
-          <a:bodyPr wrap="square" lIns="0" tIns="0" rIns="0" bIns="46800" rtlCol="0">
-            <a:spAutoFit/>
-          </a:bodyPr>
-          <a:lstStyle/>
-          <a:p>
-            <a:pPr algn="ctr"/>
-            <a:r>
-              <a:rPr lang="en-GB" sz="3600" b="1" spc="300" dirty="0" smtClean="0">
-                <a:solidFill>
-                  <a:schemeClr val="bg2"/>
-                </a:solidFill>
+            <a:r>
+              <a:rPr lang="en-US" sz="2400" dirty="0">
+                <a:latin typeface="Helvetica" pitchFamily="2" charset="0"/>
               </a:rPr>
-              <a:t>Progression</a:t>
-            </a:r>
-          </a:p>
-        </p:txBody>
-      </p:sp>
-      <p:sp>
-        <p:nvSpPr>
-          <p:cNvPr id="77" name="TextBox 76"/>
-          <p:cNvSpPr txBox="1"/>
-          <p:nvPr/>
-        </p:nvSpPr>
-        <p:spPr>
-          <a:xfrm>
-            <a:off x="1906688" y="5594920"/>
-            <a:ext cx="1368152" cy="648000"/>
-          </a:xfrm>
-          <a:prstGeom prst="rect">
-            <a:avLst/>
-          </a:prstGeom>
-          <a:noFill/>
-          <a:ln>
-            <a:noFill/>
-          </a:ln>
-        </p:spPr>
-        <p:txBody>
-          <a:bodyPr wrap="square" tIns="0" rtlCol="0" anchor="ctr" anchorCtr="1">
-            <a:noAutofit/>
-          </a:bodyPr>
-          <a:lstStyle/>
-          <a:p>
-            <a:pPr algn="ctr"/>
-            <a:r>
-              <a:rPr lang="en-GB" sz="2800" b="1" dirty="0" smtClean="0"/>
-              <a:t>HGPIN</a:t>
-            </a:r>
-          </a:p>
-        </p:txBody>
-      </p:sp>
-      <p:sp>
-        <p:nvSpPr>
-          <p:cNvPr id="78" name="TextBox 77"/>
-          <p:cNvSpPr txBox="1"/>
-          <p:nvPr/>
-        </p:nvSpPr>
-        <p:spPr>
-          <a:xfrm>
-            <a:off x="821584" y="2034631"/>
-            <a:ext cx="2592288" cy="648000"/>
-          </a:xfrm>
-          <a:prstGeom prst="rect">
-            <a:avLst/>
-          </a:prstGeom>
-          <a:noFill/>
-          <a:ln>
-            <a:noFill/>
-          </a:ln>
-        </p:spPr>
-        <p:txBody>
-          <a:bodyPr wrap="square" tIns="0" rtlCol="0" anchor="ctr" anchorCtr="1">
-            <a:noAutofit/>
-          </a:bodyPr>
-          <a:lstStyle/>
-          <a:p>
-            <a:pPr algn="ctr"/>
-            <a:r>
-              <a:rPr lang="en-GB" sz="2800" b="1" dirty="0" smtClean="0"/>
-              <a:t>Benign prostate</a:t>
-            </a:r>
-            <a:endParaRPr lang="en-GB" sz="2800" b="1" dirty="0"/>
-          </a:p>
-        </p:txBody>
-      </p:sp>
-      <p:sp>
-        <p:nvSpPr>
-          <p:cNvPr id="21" name="Oval 20"/>
-          <p:cNvSpPr/>
-          <p:nvPr/>
-        </p:nvSpPr>
-        <p:spPr>
-          <a:xfrm>
-            <a:off x="4414874" y="3426626"/>
-            <a:ext cx="540000" cy="540000"/>
-          </a:xfrm>
-          <a:prstGeom prst="ellipse">
-            <a:avLst/>
-          </a:prstGeom>
-          <a:solidFill>
-            <a:schemeClr val="tx1">
-              <a:lumMod val="50000"/>
-              <a:lumOff val="50000"/>
-            </a:schemeClr>
-          </a:solidFill>
-          <a:ln>
-            <a:solidFill>
-              <a:schemeClr val="tx1"/>
-            </a:solidFill>
-          </a:ln>
-          <a:effectLst/>
-        </p:spPr>
-        <p:style>
-          <a:lnRef idx="1">
-            <a:schemeClr val="accent1"/>
-          </a:lnRef>
-          <a:fillRef idx="3">
-            <a:schemeClr val="accent1"/>
-          </a:fillRef>
-          <a:effectRef idx="2">
-            <a:schemeClr val="accent1"/>
-          </a:effectRef>
-          <a:fontRef idx="minor">
-            <a:schemeClr val="lt1"/>
-          </a:fontRef>
-        </p:style>
-        <p:txBody>
-          <a:bodyPr lIns="72000" tIns="0" bIns="72000" rtlCol="0" anchor="ctr" anchorCtr="1"/>
-          <a:lstStyle/>
-          <a:p>
-            <a:pPr algn="ctr"/>
-            <a:r>
-              <a:rPr lang="en-US" sz="3600" b="1" dirty="0" smtClean="0"/>
-              <a:t>1</a:t>
-            </a:r>
-            <a:endParaRPr lang="en-US" sz="3600" dirty="0"/>
-          </a:p>
-        </p:txBody>
-      </p:sp>
-      <p:sp>
-        <p:nvSpPr>
-          <p:cNvPr id="22" name="Oval 21"/>
-          <p:cNvSpPr/>
-          <p:nvPr/>
-        </p:nvSpPr>
-        <p:spPr>
-          <a:xfrm>
-            <a:off x="1823404" y="4424312"/>
-            <a:ext cx="540000" cy="540000"/>
-          </a:xfrm>
-          <a:prstGeom prst="ellipse">
-            <a:avLst/>
-          </a:prstGeom>
-          <a:solidFill>
-            <a:schemeClr val="tx1">
-              <a:lumMod val="50000"/>
-              <a:lumOff val="50000"/>
-            </a:schemeClr>
-          </a:solidFill>
-          <a:ln>
-            <a:solidFill>
-              <a:schemeClr val="tx1"/>
-            </a:solidFill>
-          </a:ln>
-          <a:effectLst/>
-        </p:spPr>
-        <p:style>
-          <a:lnRef idx="1">
-            <a:schemeClr val="accent1"/>
-          </a:lnRef>
-          <a:fillRef idx="3">
-            <a:schemeClr val="accent1"/>
-          </a:fillRef>
-          <a:effectRef idx="2">
-            <a:schemeClr val="accent1"/>
-          </a:effectRef>
-          <a:fontRef idx="minor">
-            <a:schemeClr val="lt1"/>
-          </a:fontRef>
-        </p:style>
-        <p:txBody>
-          <a:bodyPr lIns="72000" tIns="0" bIns="72000" rtlCol="0" anchor="ctr" anchorCtr="1"/>
-          <a:lstStyle/>
-          <a:p>
-            <a:pPr algn="ctr"/>
-            <a:r>
-              <a:rPr lang="en-US" sz="3600" dirty="0" smtClean="0"/>
-              <a:t>2</a:t>
-            </a:r>
-            <a:endParaRPr lang="en-US" sz="3600" dirty="0"/>
-          </a:p>
-        </p:txBody>
-      </p:sp>
-      <p:sp>
-        <p:nvSpPr>
-          <p:cNvPr id="23" name="Oval 22"/>
-          <p:cNvSpPr/>
-          <p:nvPr/>
-        </p:nvSpPr>
-        <p:spPr>
-          <a:xfrm>
-            <a:off x="10474725" y="4917093"/>
-            <a:ext cx="540000" cy="540000"/>
-          </a:xfrm>
-          <a:prstGeom prst="ellipse">
-            <a:avLst/>
-          </a:prstGeom>
-          <a:solidFill>
-            <a:schemeClr val="tx1">
-              <a:lumMod val="50000"/>
-              <a:lumOff val="50000"/>
-            </a:schemeClr>
-          </a:solidFill>
-          <a:ln>
-            <a:solidFill>
-              <a:schemeClr val="tx1"/>
-            </a:solidFill>
-          </a:ln>
-          <a:effectLst/>
-        </p:spPr>
-        <p:style>
-          <a:lnRef idx="1">
-            <a:schemeClr val="accent1"/>
-          </a:lnRef>
-          <a:fillRef idx="3">
-            <a:schemeClr val="accent1"/>
-          </a:fillRef>
-          <a:effectRef idx="2">
-            <a:schemeClr val="accent1"/>
-          </a:effectRef>
-          <a:fontRef idx="minor">
-            <a:schemeClr val="lt1"/>
-          </a:fontRef>
-        </p:style>
-        <p:txBody>
-          <a:bodyPr lIns="72000" tIns="0" bIns="72000" rtlCol="0" anchor="ctr" anchorCtr="1"/>
-          <a:lstStyle/>
-          <a:p>
-            <a:pPr algn="ctr"/>
-            <a:r>
-              <a:rPr lang="en-US" sz="3600" dirty="0" smtClean="0"/>
-              <a:t>5</a:t>
-            </a:r>
-            <a:endParaRPr lang="en-US" sz="3600" dirty="0"/>
-          </a:p>
-        </p:txBody>
-      </p:sp>
-      <p:sp>
-        <p:nvSpPr>
-          <p:cNvPr id="24" name="Oval 23"/>
-          <p:cNvSpPr/>
-          <p:nvPr/>
-        </p:nvSpPr>
-        <p:spPr>
-          <a:xfrm>
-            <a:off x="4569513" y="5037181"/>
-            <a:ext cx="540000" cy="540000"/>
-          </a:xfrm>
-          <a:prstGeom prst="ellipse">
-            <a:avLst/>
-          </a:prstGeom>
-          <a:solidFill>
-            <a:schemeClr val="tx1">
-              <a:lumMod val="50000"/>
-              <a:lumOff val="50000"/>
-            </a:schemeClr>
-          </a:solidFill>
-          <a:ln>
-            <a:solidFill>
-              <a:schemeClr val="tx1"/>
-            </a:solidFill>
-          </a:ln>
-          <a:effectLst/>
-        </p:spPr>
-        <p:style>
-          <a:lnRef idx="1">
-            <a:schemeClr val="accent1"/>
-          </a:lnRef>
-          <a:fillRef idx="3">
-            <a:schemeClr val="accent1"/>
-          </a:fillRef>
-          <a:effectRef idx="2">
-            <a:schemeClr val="accent1"/>
-          </a:effectRef>
-          <a:fontRef idx="minor">
-            <a:schemeClr val="lt1"/>
-          </a:fontRef>
-        </p:style>
-        <p:txBody>
-          <a:bodyPr lIns="72000" tIns="0" bIns="72000" rtlCol="0" anchor="ctr" anchorCtr="1"/>
-          <a:lstStyle/>
-          <a:p>
-            <a:pPr algn="ctr"/>
-            <a:r>
-              <a:rPr lang="en-US" sz="3600" dirty="0" smtClean="0"/>
               <a:t>3</a:t>
             </a:r>
-            <a:endParaRPr lang="en-US" sz="3600" dirty="0"/>
-          </a:p>
-        </p:txBody>
-      </p:sp>
-      <p:sp>
-        <p:nvSpPr>
-          <p:cNvPr id="25" name="Oval 24"/>
-          <p:cNvSpPr/>
-          <p:nvPr/>
-        </p:nvSpPr>
-        <p:spPr>
-          <a:xfrm>
-            <a:off x="10008156" y="3952143"/>
-            <a:ext cx="540000" cy="540000"/>
-          </a:xfrm>
-          <a:prstGeom prst="ellipse">
-            <a:avLst/>
-          </a:prstGeom>
-          <a:solidFill>
-            <a:schemeClr val="tx1">
-              <a:lumMod val="50000"/>
-              <a:lumOff val="50000"/>
-            </a:schemeClr>
-          </a:solidFill>
-          <a:ln>
-            <a:solidFill>
-              <a:schemeClr val="tx1"/>
-            </a:solidFill>
-          </a:ln>
-          <a:effectLst/>
-        </p:spPr>
-        <p:style>
-          <a:lnRef idx="1">
-            <a:schemeClr val="accent1"/>
-          </a:lnRef>
-          <a:fillRef idx="3">
-            <a:schemeClr val="accent1"/>
-          </a:fillRef>
-          <a:effectRef idx="2">
-            <a:schemeClr val="accent1"/>
-          </a:effectRef>
-          <a:fontRef idx="minor">
-            <a:schemeClr val="lt1"/>
-          </a:fontRef>
-        </p:style>
-        <p:txBody>
-          <a:bodyPr lIns="108000" tIns="0" bIns="72000" rtlCol="0" anchor="ctr" anchorCtr="1"/>
-          <a:lstStyle/>
-          <a:p>
-            <a:pPr algn="ctr"/>
-            <a:r>
-              <a:rPr lang="en-US" sz="3600" dirty="0" smtClean="0"/>
-              <a:t>4</a:t>
-            </a:r>
-            <a:endParaRPr lang="en-US" sz="3600" dirty="0"/>
           </a:p>
         </p:txBody>
       </p:sp>
@@ -4748,13 +5438,6 @@
   <p:clrMapOvr>
     <a:masterClrMapping/>
   </p:clrMapOvr>
-  <p:timing>
-    <p:tnLst>
-      <p:par>
-        <p:cTn id="1" dur="indefinite" restart="never" nodeType="tmRoot"/>
-      </p:par>
-    </p:tnLst>
-  </p:timing>
 </p:sld>
 </file>
 

</xml_diff>